<commit_message>
Chore: Added additional workshop presentation slides
- Added slides for the topic "Different environments"
- Added slides for the topic "Self-hosted runners vs GitHub hosted runners"
</commit_message>
<xml_diff>
--- a/Workshop Presentation.pptx
+++ b/Workshop Presentation.pptx
@@ -4,6 +4,9 @@
   <p:sldMasterIdLst>
     <p:sldMasterId id="2147483648" r:id="rId1"/>
   </p:sldMasterIdLst>
+  <p:notesMasterIdLst>
+    <p:notesMasterId r:id="rId13"/>
+  </p:notesMasterIdLst>
   <p:sldIdLst>
     <p:sldId id="256" r:id="rId2"/>
     <p:sldId id="257" r:id="rId3"/>
@@ -11,7 +14,11 @@
     <p:sldId id="259" r:id="rId5"/>
     <p:sldId id="260" r:id="rId6"/>
     <p:sldId id="261" r:id="rId7"/>
-    <p:sldId id="262" r:id="rId8"/>
+    <p:sldId id="263" r:id="rId8"/>
+    <p:sldId id="265" r:id="rId9"/>
+    <p:sldId id="267" r:id="rId10"/>
+    <p:sldId id="266" r:id="rId11"/>
+    <p:sldId id="262" r:id="rId12"/>
   </p:sldIdLst>
   <p:sldSz cx="12192000" cy="6858000"/>
   <p:notesSz cx="6858000" cy="9144000"/>
@@ -110,7 +117,470 @@
       </a:defRPr>
     </a:lvl9pPr>
   </p:defaultTextStyle>
+  <p:extLst>
+    <p:ext uri="{EFAFB233-063F-42B5-8137-9DF3F51BA10A}">
+      <p15:sldGuideLst xmlns:p15="http://schemas.microsoft.com/office/powerpoint/2012/main"/>
+    </p:ext>
+  </p:extLst>
 </p:presentation>
+</file>
+
+<file path=ppt/notesMasters/notesMaster1.xml><?xml version="1.0" encoding="utf-8"?>
+<p:notesMaster xmlns:a="http://schemas.openxmlformats.org/drawingml/2006/main" xmlns:r="http://schemas.openxmlformats.org/officeDocument/2006/relationships" xmlns:p="http://schemas.openxmlformats.org/presentationml/2006/main">
+  <p:cSld>
+    <p:bg>
+      <p:bgRef idx="1001">
+        <a:schemeClr val="bg1"/>
+      </p:bgRef>
+    </p:bg>
+    <p:spTree>
+      <p:nvGrpSpPr>
+        <p:cNvPr id="1" name=""/>
+        <p:cNvGrpSpPr/>
+        <p:nvPr/>
+      </p:nvGrpSpPr>
+      <p:grpSpPr>
+        <a:xfrm>
+          <a:off x="0" y="0"/>
+          <a:ext cx="0" cy="0"/>
+          <a:chOff x="0" y="0"/>
+          <a:chExt cx="0" cy="0"/>
+        </a:xfrm>
+      </p:grpSpPr>
+      <p:sp>
+        <p:nvSpPr>
+          <p:cNvPr id="2" name="Header Placeholder 1"/>
+          <p:cNvSpPr>
+            <a:spLocks noGrp="1"/>
+          </p:cNvSpPr>
+          <p:nvPr>
+            <p:ph type="hdr" sz="quarter"/>
+          </p:nvPr>
+        </p:nvSpPr>
+        <p:spPr>
+          <a:xfrm>
+            <a:off x="0" y="0"/>
+            <a:ext cx="2971800" cy="458788"/>
+          </a:xfrm>
+          <a:prstGeom prst="rect">
+            <a:avLst/>
+          </a:prstGeom>
+        </p:spPr>
+        <p:txBody>
+          <a:bodyPr vert="horz" lIns="91440" tIns="45720" rIns="91440" bIns="45720" rtlCol="0"/>
+          <a:lstStyle>
+            <a:lvl1pPr algn="l">
+              <a:defRPr sz="1200"/>
+            </a:lvl1pPr>
+          </a:lstStyle>
+          <a:p>
+            <a:endParaRPr lang="en-NL"/>
+          </a:p>
+        </p:txBody>
+      </p:sp>
+      <p:sp>
+        <p:nvSpPr>
+          <p:cNvPr id="3" name="Date Placeholder 2"/>
+          <p:cNvSpPr>
+            <a:spLocks noGrp="1"/>
+          </p:cNvSpPr>
+          <p:nvPr>
+            <p:ph type="dt" idx="1"/>
+          </p:nvPr>
+        </p:nvSpPr>
+        <p:spPr>
+          <a:xfrm>
+            <a:off x="3884613" y="0"/>
+            <a:ext cx="2971800" cy="458788"/>
+          </a:xfrm>
+          <a:prstGeom prst="rect">
+            <a:avLst/>
+          </a:prstGeom>
+        </p:spPr>
+        <p:txBody>
+          <a:bodyPr vert="horz" lIns="91440" tIns="45720" rIns="91440" bIns="45720" rtlCol="0"/>
+          <a:lstStyle>
+            <a:lvl1pPr algn="r">
+              <a:defRPr sz="1200"/>
+            </a:lvl1pPr>
+          </a:lstStyle>
+          <a:p>
+            <a:fld id="{AEA770DF-B3DE-4089-8EA0-E301DFF3F119}" type="datetimeFigureOut">
+              <a:rPr lang="en-NL" smtClean="0"/>
+              <a:t>06/10/2024</a:t>
+            </a:fld>
+            <a:endParaRPr lang="en-NL"/>
+          </a:p>
+        </p:txBody>
+      </p:sp>
+      <p:sp>
+        <p:nvSpPr>
+          <p:cNvPr id="4" name="Slide Image Placeholder 3"/>
+          <p:cNvSpPr>
+            <a:spLocks noGrp="1" noRot="1" noChangeAspect="1"/>
+          </p:cNvSpPr>
+          <p:nvPr>
+            <p:ph type="sldImg" idx="2"/>
+          </p:nvPr>
+        </p:nvSpPr>
+        <p:spPr>
+          <a:xfrm>
+            <a:off x="685800" y="1143000"/>
+            <a:ext cx="5486400" cy="3086100"/>
+          </a:xfrm>
+          <a:prstGeom prst="rect">
+            <a:avLst/>
+          </a:prstGeom>
+          <a:noFill/>
+          <a:ln w="12700">
+            <a:solidFill>
+              <a:prstClr val="black"/>
+            </a:solidFill>
+          </a:ln>
+        </p:spPr>
+        <p:txBody>
+          <a:bodyPr vert="horz" lIns="91440" tIns="45720" rIns="91440" bIns="45720" rtlCol="0" anchor="ctr"/>
+          <a:lstStyle/>
+          <a:p>
+            <a:endParaRPr lang="en-NL"/>
+          </a:p>
+        </p:txBody>
+      </p:sp>
+      <p:sp>
+        <p:nvSpPr>
+          <p:cNvPr id="5" name="Notes Placeholder 4"/>
+          <p:cNvSpPr>
+            <a:spLocks noGrp="1"/>
+          </p:cNvSpPr>
+          <p:nvPr>
+            <p:ph type="body" sz="quarter" idx="3"/>
+          </p:nvPr>
+        </p:nvSpPr>
+        <p:spPr>
+          <a:xfrm>
+            <a:off x="685800" y="4400550"/>
+            <a:ext cx="5486400" cy="3600450"/>
+          </a:xfrm>
+          <a:prstGeom prst="rect">
+            <a:avLst/>
+          </a:prstGeom>
+        </p:spPr>
+        <p:txBody>
+          <a:bodyPr vert="horz" lIns="91440" tIns="45720" rIns="91440" bIns="45720" rtlCol="0"/>
+          <a:lstStyle/>
+          <a:p>
+            <a:pPr lvl="0"/>
+            <a:r>
+              <a:rPr lang="en-US"/>
+              <a:t>Click to edit Master text styles</a:t>
+            </a:r>
+          </a:p>
+          <a:p>
+            <a:pPr lvl="1"/>
+            <a:r>
+              <a:rPr lang="en-US"/>
+              <a:t>Second level</a:t>
+            </a:r>
+          </a:p>
+          <a:p>
+            <a:pPr lvl="2"/>
+            <a:r>
+              <a:rPr lang="en-US"/>
+              <a:t>Third level</a:t>
+            </a:r>
+          </a:p>
+          <a:p>
+            <a:pPr lvl="3"/>
+            <a:r>
+              <a:rPr lang="en-US"/>
+              <a:t>Fourth level</a:t>
+            </a:r>
+          </a:p>
+          <a:p>
+            <a:pPr lvl="4"/>
+            <a:r>
+              <a:rPr lang="en-US"/>
+              <a:t>Fifth level</a:t>
+            </a:r>
+            <a:endParaRPr lang="en-NL"/>
+          </a:p>
+        </p:txBody>
+      </p:sp>
+      <p:sp>
+        <p:nvSpPr>
+          <p:cNvPr id="6" name="Footer Placeholder 5"/>
+          <p:cNvSpPr>
+            <a:spLocks noGrp="1"/>
+          </p:cNvSpPr>
+          <p:nvPr>
+            <p:ph type="ftr" sz="quarter" idx="4"/>
+          </p:nvPr>
+        </p:nvSpPr>
+        <p:spPr>
+          <a:xfrm>
+            <a:off x="0" y="8685213"/>
+            <a:ext cx="2971800" cy="458787"/>
+          </a:xfrm>
+          <a:prstGeom prst="rect">
+            <a:avLst/>
+          </a:prstGeom>
+        </p:spPr>
+        <p:txBody>
+          <a:bodyPr vert="horz" lIns="91440" tIns="45720" rIns="91440" bIns="45720" rtlCol="0" anchor="b"/>
+          <a:lstStyle>
+            <a:lvl1pPr algn="l">
+              <a:defRPr sz="1200"/>
+            </a:lvl1pPr>
+          </a:lstStyle>
+          <a:p>
+            <a:endParaRPr lang="en-NL"/>
+          </a:p>
+        </p:txBody>
+      </p:sp>
+      <p:sp>
+        <p:nvSpPr>
+          <p:cNvPr id="7" name="Slide Number Placeholder 6"/>
+          <p:cNvSpPr>
+            <a:spLocks noGrp="1"/>
+          </p:cNvSpPr>
+          <p:nvPr>
+            <p:ph type="sldNum" sz="quarter" idx="5"/>
+          </p:nvPr>
+        </p:nvSpPr>
+        <p:spPr>
+          <a:xfrm>
+            <a:off x="3884613" y="8685213"/>
+            <a:ext cx="2971800" cy="458787"/>
+          </a:xfrm>
+          <a:prstGeom prst="rect">
+            <a:avLst/>
+          </a:prstGeom>
+        </p:spPr>
+        <p:txBody>
+          <a:bodyPr vert="horz" lIns="91440" tIns="45720" rIns="91440" bIns="45720" rtlCol="0" anchor="b"/>
+          <a:lstStyle>
+            <a:lvl1pPr algn="r">
+              <a:defRPr sz="1200"/>
+            </a:lvl1pPr>
+          </a:lstStyle>
+          <a:p>
+            <a:fld id="{7730ADC3-7037-421E-861E-093454487A16}" type="slidenum">
+              <a:rPr lang="en-NL" smtClean="0"/>
+              <a:t>‹#›</a:t>
+            </a:fld>
+            <a:endParaRPr lang="en-NL"/>
+          </a:p>
+        </p:txBody>
+      </p:sp>
+    </p:spTree>
+    <p:extLst>
+      <p:ext uri="{BB962C8B-B14F-4D97-AF65-F5344CB8AC3E}">
+        <p14:creationId xmlns:p14="http://schemas.microsoft.com/office/powerpoint/2010/main" val="1907976735"/>
+      </p:ext>
+    </p:extLst>
+  </p:cSld>
+  <p:clrMap bg1="lt1" tx1="dk1" bg2="lt2" tx2="dk2" accent1="accent1" accent2="accent2" accent3="accent3" accent4="accent4" accent5="accent5" accent6="accent6" hlink="hlink" folHlink="folHlink"/>
+  <p:notesStyle>
+    <a:lvl1pPr marL="0" algn="l" defTabSz="914400" rtl="0" eaLnBrk="1" latinLnBrk="0" hangingPunct="1">
+      <a:defRPr sz="1200" kern="1200">
+        <a:solidFill>
+          <a:schemeClr val="tx1"/>
+        </a:solidFill>
+        <a:latin typeface="+mn-lt"/>
+        <a:ea typeface="+mn-ea"/>
+        <a:cs typeface="+mn-cs"/>
+      </a:defRPr>
+    </a:lvl1pPr>
+    <a:lvl2pPr marL="457200" algn="l" defTabSz="914400" rtl="0" eaLnBrk="1" latinLnBrk="0" hangingPunct="1">
+      <a:defRPr sz="1200" kern="1200">
+        <a:solidFill>
+          <a:schemeClr val="tx1"/>
+        </a:solidFill>
+        <a:latin typeface="+mn-lt"/>
+        <a:ea typeface="+mn-ea"/>
+        <a:cs typeface="+mn-cs"/>
+      </a:defRPr>
+    </a:lvl2pPr>
+    <a:lvl3pPr marL="914400" algn="l" defTabSz="914400" rtl="0" eaLnBrk="1" latinLnBrk="0" hangingPunct="1">
+      <a:defRPr sz="1200" kern="1200">
+        <a:solidFill>
+          <a:schemeClr val="tx1"/>
+        </a:solidFill>
+        <a:latin typeface="+mn-lt"/>
+        <a:ea typeface="+mn-ea"/>
+        <a:cs typeface="+mn-cs"/>
+      </a:defRPr>
+    </a:lvl3pPr>
+    <a:lvl4pPr marL="1371600" algn="l" defTabSz="914400" rtl="0" eaLnBrk="1" latinLnBrk="0" hangingPunct="1">
+      <a:defRPr sz="1200" kern="1200">
+        <a:solidFill>
+          <a:schemeClr val="tx1"/>
+        </a:solidFill>
+        <a:latin typeface="+mn-lt"/>
+        <a:ea typeface="+mn-ea"/>
+        <a:cs typeface="+mn-cs"/>
+      </a:defRPr>
+    </a:lvl4pPr>
+    <a:lvl5pPr marL="1828800" algn="l" defTabSz="914400" rtl="0" eaLnBrk="1" latinLnBrk="0" hangingPunct="1">
+      <a:defRPr sz="1200" kern="1200">
+        <a:solidFill>
+          <a:schemeClr val="tx1"/>
+        </a:solidFill>
+        <a:latin typeface="+mn-lt"/>
+        <a:ea typeface="+mn-ea"/>
+        <a:cs typeface="+mn-cs"/>
+      </a:defRPr>
+    </a:lvl5pPr>
+    <a:lvl6pPr marL="2286000" algn="l" defTabSz="914400" rtl="0" eaLnBrk="1" latinLnBrk="0" hangingPunct="1">
+      <a:defRPr sz="1200" kern="1200">
+        <a:solidFill>
+          <a:schemeClr val="tx1"/>
+        </a:solidFill>
+        <a:latin typeface="+mn-lt"/>
+        <a:ea typeface="+mn-ea"/>
+        <a:cs typeface="+mn-cs"/>
+      </a:defRPr>
+    </a:lvl6pPr>
+    <a:lvl7pPr marL="2743200" algn="l" defTabSz="914400" rtl="0" eaLnBrk="1" latinLnBrk="0" hangingPunct="1">
+      <a:defRPr sz="1200" kern="1200">
+        <a:solidFill>
+          <a:schemeClr val="tx1"/>
+        </a:solidFill>
+        <a:latin typeface="+mn-lt"/>
+        <a:ea typeface="+mn-ea"/>
+        <a:cs typeface="+mn-cs"/>
+      </a:defRPr>
+    </a:lvl7pPr>
+    <a:lvl8pPr marL="3200400" algn="l" defTabSz="914400" rtl="0" eaLnBrk="1" latinLnBrk="0" hangingPunct="1">
+      <a:defRPr sz="1200" kern="1200">
+        <a:solidFill>
+          <a:schemeClr val="tx1"/>
+        </a:solidFill>
+        <a:latin typeface="+mn-lt"/>
+        <a:ea typeface="+mn-ea"/>
+        <a:cs typeface="+mn-cs"/>
+      </a:defRPr>
+    </a:lvl8pPr>
+    <a:lvl9pPr marL="3657600" algn="l" defTabSz="914400" rtl="0" eaLnBrk="1" latinLnBrk="0" hangingPunct="1">
+      <a:defRPr sz="1200" kern="1200">
+        <a:solidFill>
+          <a:schemeClr val="tx1"/>
+        </a:solidFill>
+        <a:latin typeface="+mn-lt"/>
+        <a:ea typeface="+mn-ea"/>
+        <a:cs typeface="+mn-cs"/>
+      </a:defRPr>
+    </a:lvl9pPr>
+  </p:notesStyle>
+</p:notesMaster>
+</file>
+
+<file path=ppt/notesSlides/notesSlide1.xml><?xml version="1.0" encoding="utf-8"?>
+<p:notes xmlns:a="http://schemas.openxmlformats.org/drawingml/2006/main" xmlns:r="http://schemas.openxmlformats.org/officeDocument/2006/relationships" xmlns:p="http://schemas.openxmlformats.org/presentationml/2006/main">
+  <p:cSld>
+    <p:spTree>
+      <p:nvGrpSpPr>
+        <p:cNvPr id="1" name=""/>
+        <p:cNvGrpSpPr/>
+        <p:nvPr/>
+      </p:nvGrpSpPr>
+      <p:grpSpPr>
+        <a:xfrm>
+          <a:off x="0" y="0"/>
+          <a:ext cx="0" cy="0"/>
+          <a:chOff x="0" y="0"/>
+          <a:chExt cx="0" cy="0"/>
+        </a:xfrm>
+      </p:grpSpPr>
+      <p:sp>
+        <p:nvSpPr>
+          <p:cNvPr id="2" name="Slide Image Placeholder 1"/>
+          <p:cNvSpPr>
+            <a:spLocks noGrp="1" noRot="1" noChangeAspect="1"/>
+          </p:cNvSpPr>
+          <p:nvPr>
+            <p:ph type="sldImg"/>
+          </p:nvPr>
+        </p:nvSpPr>
+        <p:spPr/>
+      </p:sp>
+      <p:sp>
+        <p:nvSpPr>
+          <p:cNvPr id="3" name="Notes Placeholder 2"/>
+          <p:cNvSpPr>
+            <a:spLocks noGrp="1"/>
+          </p:cNvSpPr>
+          <p:nvPr>
+            <p:ph type="body" idx="1"/>
+          </p:nvPr>
+        </p:nvSpPr>
+        <p:spPr/>
+        <p:txBody>
+          <a:bodyPr/>
+          <a:lstStyle/>
+          <a:p>
+            <a:r>
+              <a:rPr lang="en-US" dirty="0"/>
+              <a:t>Name – mention that its optional and that if you don’t provide one it will default to the file name itself</a:t>
+            </a:r>
+          </a:p>
+          <a:p>
+            <a:r>
+              <a:rPr lang="en-US" dirty="0"/>
+              <a:t>Triggering events – mention that there are more triggers than these two which can be found in the </a:t>
+            </a:r>
+            <a:r>
+              <a:rPr lang="en-US" dirty="0" err="1"/>
+              <a:t>github</a:t>
+            </a:r>
+            <a:r>
+              <a:rPr lang="en-US" dirty="0"/>
+              <a:t> docs </a:t>
+            </a:r>
+          </a:p>
+          <a:p>
+            <a:r>
+              <a:rPr lang="en-US" dirty="0"/>
+              <a:t>Jobs definition:  mention that there can be multiple jobs and that they can be chained </a:t>
+            </a:r>
+            <a:endParaRPr lang="en-NL" dirty="0"/>
+          </a:p>
+        </p:txBody>
+      </p:sp>
+      <p:sp>
+        <p:nvSpPr>
+          <p:cNvPr id="4" name="Slide Number Placeholder 3"/>
+          <p:cNvSpPr>
+            <a:spLocks noGrp="1"/>
+          </p:cNvSpPr>
+          <p:nvPr>
+            <p:ph type="sldNum" sz="quarter" idx="5"/>
+          </p:nvPr>
+        </p:nvSpPr>
+        <p:spPr/>
+        <p:txBody>
+          <a:bodyPr/>
+          <a:lstStyle/>
+          <a:p>
+            <a:fld id="{7730ADC3-7037-421E-861E-093454487A16}" type="slidenum">
+              <a:rPr lang="en-NL" smtClean="0"/>
+              <a:t>7</a:t>
+            </a:fld>
+            <a:endParaRPr lang="en-NL"/>
+          </a:p>
+        </p:txBody>
+      </p:sp>
+    </p:spTree>
+    <p:extLst>
+      <p:ext uri="{BB962C8B-B14F-4D97-AF65-F5344CB8AC3E}">
+        <p14:creationId xmlns:p14="http://schemas.microsoft.com/office/powerpoint/2010/main" val="1991899244"/>
+      </p:ext>
+    </p:extLst>
+  </p:cSld>
+  <p:clrMapOvr>
+    <a:masterClrMapping/>
+  </p:clrMapOvr>
+</p:notes>
 </file>
 
 <file path=ppt/slideLayouts/slideLayout1.xml><?xml version="1.0" encoding="utf-8"?>
@@ -299,7 +769,7 @@
           <a:p>
             <a:fld id="{4AAD347D-5ACD-4C99-B74B-A9C85AD731AF}" type="datetimeFigureOut">
               <a:rPr lang="en-US" dirty="0"/>
-              <a:t>9/17/2024</a:t>
+              <a:t>10/6/2024</a:t>
             </a:fld>
             <a:endParaRPr lang="en-US" dirty="0"/>
           </a:p>
@@ -569,7 +1039,7 @@
           <a:p>
             <a:fld id="{4509A250-FF31-4206-8172-F9D3106AACB1}" type="datetimeFigureOut">
               <a:rPr lang="en-US" dirty="0"/>
-              <a:t>9/17/2024</a:t>
+              <a:t>10/6/2024</a:t>
             </a:fld>
             <a:endParaRPr lang="en-US" dirty="0"/>
           </a:p>
@@ -758,7 +1228,7 @@
           <a:p>
             <a:fld id="{4509A250-FF31-4206-8172-F9D3106AACB1}" type="datetimeFigureOut">
               <a:rPr lang="en-US" dirty="0"/>
-              <a:t>9/17/2024</a:t>
+              <a:t>10/6/2024</a:t>
             </a:fld>
             <a:endParaRPr lang="en-US" dirty="0"/>
           </a:p>
@@ -1024,7 +1494,7 @@
           <a:p>
             <a:fld id="{4509A250-FF31-4206-8172-F9D3106AACB1}" type="datetimeFigureOut">
               <a:rPr lang="en-US" dirty="0"/>
-              <a:t>9/17/2024</a:t>
+              <a:t>10/6/2024</a:t>
             </a:fld>
             <a:endParaRPr lang="en-US" dirty="0"/>
           </a:p>
@@ -1346,7 +1816,7 @@
           <a:p>
             <a:fld id="{4509A250-FF31-4206-8172-F9D3106AACB1}" type="datetimeFigureOut">
               <a:rPr lang="en-US" dirty="0"/>
-              <a:t>9/17/2024</a:t>
+              <a:t>10/6/2024</a:t>
             </a:fld>
             <a:endParaRPr lang="en-US" dirty="0"/>
           </a:p>
@@ -1960,7 +2430,7 @@
           <a:p>
             <a:fld id="{4509A250-FF31-4206-8172-F9D3106AACB1}" type="datetimeFigureOut">
               <a:rPr lang="en-US" dirty="0"/>
-              <a:t>9/17/2024</a:t>
+              <a:t>10/6/2024</a:t>
             </a:fld>
             <a:endParaRPr lang="en-US" dirty="0"/>
           </a:p>
@@ -2802,7 +3272,7 @@
           <a:p>
             <a:fld id="{4509A250-FF31-4206-8172-F9D3106AACB1}" type="datetimeFigureOut">
               <a:rPr lang="en-US" dirty="0"/>
-              <a:t>9/17/2024</a:t>
+              <a:t>10/6/2024</a:t>
             </a:fld>
             <a:endParaRPr lang="en-US" dirty="0"/>
           </a:p>
@@ -2967,7 +3437,7 @@
           <a:p>
             <a:fld id="{4509A250-FF31-4206-8172-F9D3106AACB1}" type="datetimeFigureOut">
               <a:rPr lang="en-US" dirty="0"/>
-              <a:t>9/17/2024</a:t>
+              <a:t>10/6/2024</a:t>
             </a:fld>
             <a:endParaRPr lang="en-US" dirty="0"/>
           </a:p>
@@ -3142,7 +3612,7 @@
           <a:p>
             <a:fld id="{4509A250-FF31-4206-8172-F9D3106AACB1}" type="datetimeFigureOut">
               <a:rPr lang="en-US" dirty="0"/>
-              <a:t>9/17/2024</a:t>
+              <a:t>10/6/2024</a:t>
             </a:fld>
             <a:endParaRPr lang="en-US" dirty="0"/>
           </a:p>
@@ -3307,7 +3777,7 @@
           <a:p>
             <a:fld id="{9796027F-7875-4030-9381-8BD8C4F21935}" type="datetimeFigureOut">
               <a:rPr lang="en-US" dirty="0"/>
-              <a:t>9/17/2024</a:t>
+              <a:t>10/6/2024</a:t>
             </a:fld>
             <a:endParaRPr lang="en-US" dirty="0"/>
           </a:p>
@@ -3549,7 +4019,7 @@
           <a:p>
             <a:fld id="{9796027F-7875-4030-9381-8BD8C4F21935}" type="datetimeFigureOut">
               <a:rPr lang="en-US" dirty="0"/>
-              <a:t>9/17/2024</a:t>
+              <a:t>10/6/2024</a:t>
             </a:fld>
             <a:endParaRPr lang="en-US" dirty="0"/>
           </a:p>
@@ -3836,7 +4306,7 @@
           <a:p>
             <a:fld id="{9796027F-7875-4030-9381-8BD8C4F21935}" type="datetimeFigureOut">
               <a:rPr lang="en-US" dirty="0"/>
-              <a:t>9/17/2024</a:t>
+              <a:t>10/6/2024</a:t>
             </a:fld>
             <a:endParaRPr lang="en-US" dirty="0"/>
           </a:p>
@@ -4275,7 +4745,7 @@
           <a:p>
             <a:fld id="{9796027F-7875-4030-9381-8BD8C4F21935}" type="datetimeFigureOut">
               <a:rPr lang="en-US" dirty="0"/>
-              <a:t>9/17/2024</a:t>
+              <a:t>10/6/2024</a:t>
             </a:fld>
             <a:endParaRPr lang="en-US" dirty="0"/>
           </a:p>
@@ -4388,7 +4858,7 @@
           <a:p>
             <a:fld id="{4509A250-FF31-4206-8172-F9D3106AACB1}" type="datetimeFigureOut">
               <a:rPr lang="en-US" dirty="0"/>
-              <a:t>9/17/2024</a:t>
+              <a:t>10/6/2024</a:t>
             </a:fld>
             <a:endParaRPr lang="en-US" dirty="0"/>
           </a:p>
@@ -4478,7 +4948,7 @@
           <a:p>
             <a:fld id="{4509A250-FF31-4206-8172-F9D3106AACB1}" type="datetimeFigureOut">
               <a:rPr lang="en-US" dirty="0"/>
-              <a:t>9/17/2024</a:t>
+              <a:t>10/6/2024</a:t>
             </a:fld>
             <a:endParaRPr lang="en-US" dirty="0"/>
           </a:p>
@@ -4752,7 +5222,7 @@
           <a:p>
             <a:fld id="{4509A250-FF31-4206-8172-F9D3106AACB1}" type="datetimeFigureOut">
               <a:rPr lang="en-US" dirty="0"/>
-              <a:t>9/17/2024</a:t>
+              <a:t>10/6/2024</a:t>
             </a:fld>
             <a:endParaRPr lang="en-US" dirty="0"/>
           </a:p>
@@ -5022,7 +5492,7 @@
           <a:p>
             <a:fld id="{4509A250-FF31-4206-8172-F9D3106AACB1}" type="datetimeFigureOut">
               <a:rPr lang="en-US" dirty="0"/>
-              <a:t>9/17/2024</a:t>
+              <a:t>10/6/2024</a:t>
             </a:fld>
             <a:endParaRPr lang="en-US" dirty="0"/>
           </a:p>
@@ -5440,7 +5910,7 @@
           <a:p>
             <a:fld id="{4AAD347D-5ACD-4C99-B74B-A9C85AD731AF}" type="datetimeFigureOut">
               <a:rPr lang="en-US" dirty="0"/>
-              <a:t>9/17/2024</a:t>
+              <a:t>10/6/2024</a:t>
             </a:fld>
             <a:endParaRPr lang="en-US" dirty="0"/>
           </a:p>
@@ -6042,6 +6512,346 @@
 </p:sld>
 </file>
 
+<file path=ppt/slides/slide10.xml><?xml version="1.0" encoding="utf-8"?>
+<p:sld xmlns:a="http://schemas.openxmlformats.org/drawingml/2006/main" xmlns:r="http://schemas.openxmlformats.org/officeDocument/2006/relationships" xmlns:p="http://schemas.openxmlformats.org/presentationml/2006/main">
+  <p:cSld>
+    <p:spTree>
+      <p:nvGrpSpPr>
+        <p:cNvPr id="1" name=""/>
+        <p:cNvGrpSpPr/>
+        <p:nvPr/>
+      </p:nvGrpSpPr>
+      <p:grpSpPr>
+        <a:xfrm>
+          <a:off x="0" y="0"/>
+          <a:ext cx="0" cy="0"/>
+          <a:chOff x="0" y="0"/>
+          <a:chExt cx="0" cy="0"/>
+        </a:xfrm>
+      </p:grpSpPr>
+      <p:sp>
+        <p:nvSpPr>
+          <p:cNvPr id="2" name="Title 1">
+            <a:extLst>
+              <a:ext uri="{FF2B5EF4-FFF2-40B4-BE49-F238E27FC236}">
+                <a16:creationId xmlns:a16="http://schemas.microsoft.com/office/drawing/2014/main" id="{BD7BD81A-CC1E-78F0-2071-6CDE4CB9D085}"/>
+              </a:ext>
+            </a:extLst>
+          </p:cNvPr>
+          <p:cNvSpPr>
+            <a:spLocks noGrp="1"/>
+          </p:cNvSpPr>
+          <p:nvPr>
+            <p:ph type="title"/>
+          </p:nvPr>
+        </p:nvSpPr>
+        <p:spPr/>
+        <p:txBody>
+          <a:bodyPr/>
+          <a:lstStyle/>
+          <a:p>
+            <a:endParaRPr lang="en-NL" dirty="0"/>
+          </a:p>
+        </p:txBody>
+      </p:sp>
+      <p:sp>
+        <p:nvSpPr>
+          <p:cNvPr id="3" name="Text Placeholder 2">
+            <a:extLst>
+              <a:ext uri="{FF2B5EF4-FFF2-40B4-BE49-F238E27FC236}">
+                <a16:creationId xmlns:a16="http://schemas.microsoft.com/office/drawing/2014/main" id="{B9D9C993-CB37-FBCC-E2E1-87FDA9CC0216}"/>
+              </a:ext>
+            </a:extLst>
+          </p:cNvPr>
+          <p:cNvSpPr>
+            <a:spLocks noGrp="1"/>
+          </p:cNvSpPr>
+          <p:nvPr>
+            <p:ph type="body" idx="1"/>
+          </p:nvPr>
+        </p:nvSpPr>
+        <p:spPr/>
+        <p:txBody>
+          <a:bodyPr/>
+          <a:lstStyle/>
+          <a:p>
+            <a:endParaRPr lang="en-NL"/>
+          </a:p>
+        </p:txBody>
+      </p:sp>
+      <p:sp>
+        <p:nvSpPr>
+          <p:cNvPr id="4" name="Text Placeholder 3">
+            <a:extLst>
+              <a:ext uri="{FF2B5EF4-FFF2-40B4-BE49-F238E27FC236}">
+                <a16:creationId xmlns:a16="http://schemas.microsoft.com/office/drawing/2014/main" id="{FA4333D4-099E-3201-D8B0-1A0FB6186ABE}"/>
+              </a:ext>
+            </a:extLst>
+          </p:cNvPr>
+          <p:cNvSpPr>
+            <a:spLocks noGrp="1"/>
+          </p:cNvSpPr>
+          <p:nvPr>
+            <p:ph type="body" sz="half" idx="15"/>
+          </p:nvPr>
+        </p:nvSpPr>
+        <p:spPr/>
+        <p:txBody>
+          <a:bodyPr/>
+          <a:lstStyle/>
+          <a:p>
+            <a:endParaRPr lang="en-NL"/>
+          </a:p>
+        </p:txBody>
+      </p:sp>
+      <p:sp>
+        <p:nvSpPr>
+          <p:cNvPr id="5" name="Text Placeholder 4">
+            <a:extLst>
+              <a:ext uri="{FF2B5EF4-FFF2-40B4-BE49-F238E27FC236}">
+                <a16:creationId xmlns:a16="http://schemas.microsoft.com/office/drawing/2014/main" id="{E7EC7EE2-E83A-BEA0-CEC2-9F34047D2298}"/>
+              </a:ext>
+            </a:extLst>
+          </p:cNvPr>
+          <p:cNvSpPr>
+            <a:spLocks noGrp="1"/>
+          </p:cNvSpPr>
+          <p:nvPr>
+            <p:ph type="body" sz="quarter" idx="3"/>
+          </p:nvPr>
+        </p:nvSpPr>
+        <p:spPr/>
+        <p:txBody>
+          <a:bodyPr/>
+          <a:lstStyle/>
+          <a:p>
+            <a:endParaRPr lang="en-NL"/>
+          </a:p>
+        </p:txBody>
+      </p:sp>
+      <p:sp>
+        <p:nvSpPr>
+          <p:cNvPr id="6" name="Text Placeholder 5">
+            <a:extLst>
+              <a:ext uri="{FF2B5EF4-FFF2-40B4-BE49-F238E27FC236}">
+                <a16:creationId xmlns:a16="http://schemas.microsoft.com/office/drawing/2014/main" id="{B31D96DA-F18B-80F4-97EC-74F91EFAE7DC}"/>
+              </a:ext>
+            </a:extLst>
+          </p:cNvPr>
+          <p:cNvSpPr>
+            <a:spLocks noGrp="1"/>
+          </p:cNvSpPr>
+          <p:nvPr>
+            <p:ph type="body" sz="half" idx="16"/>
+          </p:nvPr>
+        </p:nvSpPr>
+        <p:spPr/>
+        <p:txBody>
+          <a:bodyPr/>
+          <a:lstStyle/>
+          <a:p>
+            <a:endParaRPr lang="en-NL"/>
+          </a:p>
+        </p:txBody>
+      </p:sp>
+      <p:sp>
+        <p:nvSpPr>
+          <p:cNvPr id="7" name="Text Placeholder 6">
+            <a:extLst>
+              <a:ext uri="{FF2B5EF4-FFF2-40B4-BE49-F238E27FC236}">
+                <a16:creationId xmlns:a16="http://schemas.microsoft.com/office/drawing/2014/main" id="{756A585D-98B9-BB0A-CC24-F98DCFD5AFD8}"/>
+              </a:ext>
+            </a:extLst>
+          </p:cNvPr>
+          <p:cNvSpPr>
+            <a:spLocks noGrp="1"/>
+          </p:cNvSpPr>
+          <p:nvPr>
+            <p:ph type="body" sz="quarter" idx="13"/>
+          </p:nvPr>
+        </p:nvSpPr>
+        <p:spPr/>
+        <p:txBody>
+          <a:bodyPr/>
+          <a:lstStyle/>
+          <a:p>
+            <a:endParaRPr lang="en-NL"/>
+          </a:p>
+        </p:txBody>
+      </p:sp>
+      <p:sp>
+        <p:nvSpPr>
+          <p:cNvPr id="8" name="Text Placeholder 7">
+            <a:extLst>
+              <a:ext uri="{FF2B5EF4-FFF2-40B4-BE49-F238E27FC236}">
+                <a16:creationId xmlns:a16="http://schemas.microsoft.com/office/drawing/2014/main" id="{A1BA01E0-9E99-9D99-F987-455696F1F55E}"/>
+              </a:ext>
+            </a:extLst>
+          </p:cNvPr>
+          <p:cNvSpPr>
+            <a:spLocks noGrp="1"/>
+          </p:cNvSpPr>
+          <p:nvPr>
+            <p:ph type="body" sz="half" idx="17"/>
+          </p:nvPr>
+        </p:nvSpPr>
+        <p:spPr/>
+        <p:txBody>
+          <a:bodyPr/>
+          <a:lstStyle/>
+          <a:p>
+            <a:endParaRPr lang="en-NL"/>
+          </a:p>
+        </p:txBody>
+      </p:sp>
+    </p:spTree>
+    <p:extLst>
+      <p:ext uri="{BB962C8B-B14F-4D97-AF65-F5344CB8AC3E}">
+        <p14:creationId xmlns:p14="http://schemas.microsoft.com/office/powerpoint/2010/main" val="3160520767"/>
+      </p:ext>
+    </p:extLst>
+  </p:cSld>
+  <p:clrMapOvr>
+    <a:masterClrMapping/>
+  </p:clrMapOvr>
+</p:sld>
+</file>
+
+<file path=ppt/slides/slide11.xml><?xml version="1.0" encoding="utf-8"?>
+<p:sld xmlns:a="http://schemas.openxmlformats.org/drawingml/2006/main" xmlns:r="http://schemas.openxmlformats.org/officeDocument/2006/relationships" xmlns:p="http://schemas.openxmlformats.org/presentationml/2006/main">
+  <p:cSld>
+    <p:spTree>
+      <p:nvGrpSpPr>
+        <p:cNvPr id="1" name=""/>
+        <p:cNvGrpSpPr/>
+        <p:nvPr/>
+      </p:nvGrpSpPr>
+      <p:grpSpPr>
+        <a:xfrm>
+          <a:off x="0" y="0"/>
+          <a:ext cx="0" cy="0"/>
+          <a:chOff x="0" y="0"/>
+          <a:chExt cx="0" cy="0"/>
+        </a:xfrm>
+      </p:grpSpPr>
+      <p:sp>
+        <p:nvSpPr>
+          <p:cNvPr id="2" name="Title 1">
+            <a:extLst>
+              <a:ext uri="{FF2B5EF4-FFF2-40B4-BE49-F238E27FC236}">
+                <a16:creationId xmlns:a16="http://schemas.microsoft.com/office/drawing/2014/main" id="{EC894CEE-C723-D04D-4246-F43CD9BBA61B}"/>
+              </a:ext>
+            </a:extLst>
+          </p:cNvPr>
+          <p:cNvSpPr>
+            <a:spLocks noGrp="1"/>
+          </p:cNvSpPr>
+          <p:nvPr>
+            <p:ph type="title"/>
+          </p:nvPr>
+        </p:nvSpPr>
+        <p:spPr/>
+        <p:txBody>
+          <a:bodyPr/>
+          <a:lstStyle/>
+          <a:p>
+            <a:endParaRPr lang="en-NL" dirty="0"/>
+          </a:p>
+        </p:txBody>
+      </p:sp>
+      <p:sp>
+        <p:nvSpPr>
+          <p:cNvPr id="3" name="Content Placeholder 2">
+            <a:extLst>
+              <a:ext uri="{FF2B5EF4-FFF2-40B4-BE49-F238E27FC236}">
+                <a16:creationId xmlns:a16="http://schemas.microsoft.com/office/drawing/2014/main" id="{644EEBFD-DFAB-6FAB-791E-F3D1917AD59D}"/>
+              </a:ext>
+            </a:extLst>
+          </p:cNvPr>
+          <p:cNvSpPr>
+            <a:spLocks noGrp="1"/>
+          </p:cNvSpPr>
+          <p:nvPr>
+            <p:ph idx="1"/>
+          </p:nvPr>
+        </p:nvSpPr>
+        <p:spPr/>
+        <p:txBody>
+          <a:bodyPr/>
+          <a:lstStyle/>
+          <a:p>
+            <a:r>
+              <a:rPr lang="en-US" dirty="0" err="1"/>
+              <a:t>Quizz</a:t>
+            </a:r>
+            <a:r>
+              <a:rPr lang="en-US" dirty="0"/>
+              <a:t>, feedback</a:t>
+            </a:r>
+            <a:endParaRPr lang="en-NL" dirty="0"/>
+          </a:p>
+        </p:txBody>
+      </p:sp>
+      <p:pic>
+        <p:nvPicPr>
+          <p:cNvPr id="2052" name="Picture 4" descr="How Do I Segregate Environments | Bunnyshell">
+            <a:extLst>
+              <a:ext uri="{FF2B5EF4-FFF2-40B4-BE49-F238E27FC236}">
+                <a16:creationId xmlns:a16="http://schemas.microsoft.com/office/drawing/2014/main" id="{67F0F423-1E98-0DAD-8AD8-4340451A5316}"/>
+              </a:ext>
+            </a:extLst>
+          </p:cNvPr>
+          <p:cNvPicPr>
+            <a:picLocks noChangeAspect="1" noChangeArrowheads="1"/>
+          </p:cNvPicPr>
+          <p:nvPr/>
+        </p:nvPicPr>
+        <p:blipFill>
+          <a:blip r:embed="rId2">
+            <a:extLst>
+              <a:ext uri="{28A0092B-C50C-407E-A947-70E740481C1C}">
+                <a14:useLocalDpi xmlns:a14="http://schemas.microsoft.com/office/drawing/2010/main" val="0"/>
+              </a:ext>
+            </a:extLst>
+          </a:blip>
+          <a:srcRect/>
+          <a:stretch>
+            <a:fillRect/>
+          </a:stretch>
+        </p:blipFill>
+        <p:spPr bwMode="auto">
+          <a:xfrm>
+            <a:off x="2594008" y="3901098"/>
+            <a:ext cx="5715000" cy="1908439"/>
+          </a:xfrm>
+          <a:prstGeom prst="rect">
+            <a:avLst/>
+          </a:prstGeom>
+          <a:noFill/>
+          <a:extLst>
+            <a:ext uri="{909E8E84-426E-40DD-AFC4-6F175D3DCCD1}">
+              <a14:hiddenFill xmlns:a14="http://schemas.microsoft.com/office/drawing/2010/main">
+                <a:solidFill>
+                  <a:srgbClr val="FFFFFF"/>
+                </a:solidFill>
+              </a14:hiddenFill>
+            </a:ext>
+          </a:extLst>
+        </p:spPr>
+      </p:pic>
+    </p:spTree>
+    <p:extLst>
+      <p:ext uri="{BB962C8B-B14F-4D97-AF65-F5344CB8AC3E}">
+        <p14:creationId xmlns:p14="http://schemas.microsoft.com/office/powerpoint/2010/main" val="3970810213"/>
+      </p:ext>
+    </p:extLst>
+  </p:cSld>
+  <p:clrMapOvr>
+    <a:masterClrMapping/>
+  </p:clrMapOvr>
+</p:sld>
+</file>
+
 <file path=ppt/slides/slide2.xml><?xml version="1.0" encoding="utf-8"?>
 <p:sld xmlns:a="http://schemas.openxmlformats.org/drawingml/2006/main" xmlns:r="http://schemas.openxmlformats.org/officeDocument/2006/relationships" xmlns:p="http://schemas.openxmlformats.org/presentationml/2006/main">
   <p:cSld>
@@ -8399,7 +9209,7 @@
           <p:cNvPr id="2" name="Title 1">
             <a:extLst>
               <a:ext uri="{FF2B5EF4-FFF2-40B4-BE49-F238E27FC236}">
-                <a16:creationId xmlns:a16="http://schemas.microsoft.com/office/drawing/2014/main" id="{EC894CEE-C723-D04D-4246-F43CD9BBA61B}"/>
+                <a16:creationId xmlns:a16="http://schemas.microsoft.com/office/drawing/2014/main" id="{1DAB0C1F-63E1-640C-F732-37489419C714}"/>
               </a:ext>
             </a:extLst>
           </p:cNvPr>
@@ -8410,12 +9220,21 @@
             <p:ph type="title"/>
           </p:nvPr>
         </p:nvSpPr>
-        <p:spPr/>
+        <p:spPr>
+          <a:xfrm>
+            <a:off x="0" y="-69270"/>
+            <a:ext cx="9404723" cy="1400530"/>
+          </a:xfrm>
+        </p:spPr>
         <p:txBody>
           <a:bodyPr/>
           <a:lstStyle/>
           <a:p>
-            <a:endParaRPr lang="en-NL"/>
+            <a:r>
+              <a:rPr lang="en-US" dirty="0"/>
+              <a:t>Understanding GitHub Actions Workflow Syntax</a:t>
+            </a:r>
+            <a:endParaRPr lang="en-NL" dirty="0"/>
           </a:p>
         </p:txBody>
       </p:sp>
@@ -8424,7 +9243,7 @@
           <p:cNvPr id="3" name="Content Placeholder 2">
             <a:extLst>
               <a:ext uri="{FF2B5EF4-FFF2-40B4-BE49-F238E27FC236}">
-                <a16:creationId xmlns:a16="http://schemas.microsoft.com/office/drawing/2014/main" id="{644EEBFD-DFAB-6FAB-791E-F3D1917AD59D}"/>
+                <a16:creationId xmlns:a16="http://schemas.microsoft.com/office/drawing/2014/main" id="{B6DAC5A2-B54A-FDFD-36F9-9581D5305756}"/>
               </a:ext>
             </a:extLst>
           </p:cNvPr>
@@ -8435,19 +9254,707 @@
             <p:ph idx="1"/>
           </p:nvPr>
         </p:nvSpPr>
-        <p:spPr/>
-        <p:txBody>
-          <a:bodyPr/>
-          <a:lstStyle/>
-          <a:p>
-            <a:endParaRPr lang="en-NL"/>
-          </a:p>
-        </p:txBody>
-      </p:sp>
+        <p:spPr>
+          <a:xfrm>
+            <a:off x="6340001" y="1331306"/>
+            <a:ext cx="5795750" cy="5489420"/>
+          </a:xfrm>
+        </p:spPr>
+        <p:txBody>
+          <a:bodyPr>
+            <a:normAutofit lnSpcReduction="10000"/>
+          </a:bodyPr>
+          <a:lstStyle/>
+          <a:p>
+            <a:r>
+              <a:rPr lang="en-US" dirty="0"/>
+              <a:t>name - </a:t>
+            </a:r>
+            <a:r>
+              <a:rPr lang="en-US" sz="1400" dirty="0"/>
+              <a:t>Assigns a name to your workflow. This name appears in the GitHub Actions tab.</a:t>
+            </a:r>
+          </a:p>
+          <a:p>
+            <a:r>
+              <a:rPr lang="nl-NL" dirty="0"/>
+              <a:t>Triggering Events (on): </a:t>
+            </a:r>
+            <a:r>
+              <a:rPr lang="nl-NL" sz="1400" dirty="0"/>
+              <a:t>specifies the events that trigger a workflow, in this example it triggers on push and pull</a:t>
+            </a:r>
+          </a:p>
+          <a:p>
+            <a:r>
+              <a:rPr lang="nl-NL" dirty="0"/>
+              <a:t>Jobs Definition: </a:t>
+            </a:r>
+            <a:r>
+              <a:rPr lang="nl-NL" sz="1400" dirty="0"/>
+              <a:t>unit of work that runs commands(build is the name of the job)</a:t>
+            </a:r>
+          </a:p>
+          <a:p>
+            <a:r>
+              <a:rPr lang="nl-NL" dirty="0"/>
+              <a:t>Runs-on: </a:t>
+            </a:r>
+            <a:r>
+              <a:rPr lang="nl-NL" sz="1400" dirty="0"/>
+              <a:t>required attribute that you must have. It indicates the virtual enviroment where the job is running.</a:t>
+            </a:r>
+          </a:p>
+          <a:p>
+            <a:r>
+              <a:rPr lang="nl-NL" dirty="0"/>
+              <a:t>Steps: </a:t>
+            </a:r>
+            <a:r>
+              <a:rPr lang="en-US" sz="1400" dirty="0"/>
+              <a:t>building blocks of a </a:t>
+            </a:r>
+            <a:r>
+              <a:rPr lang="en-US" sz="1400" b="1" dirty="0"/>
+              <a:t>job</a:t>
+            </a:r>
+            <a:r>
+              <a:rPr lang="en-US" sz="1400" dirty="0"/>
+              <a:t> in a GitHub Actions workflow. Think of them as individual tasks that a job needs to perform.</a:t>
+            </a:r>
+            <a:endParaRPr lang="nl-NL" sz="1400" dirty="0"/>
+          </a:p>
+          <a:p>
+            <a:r>
+              <a:rPr lang="nl-NL" sz="2200" dirty="0"/>
+              <a:t>Uses</a:t>
+            </a:r>
+            <a:r>
+              <a:rPr lang="nl-NL" sz="1700" dirty="0"/>
+              <a:t>: </a:t>
+            </a:r>
+            <a:r>
+              <a:rPr lang="en-US" sz="1400" dirty="0"/>
+              <a:t>keyword in GitHub Actions that allows you to include and execute pre-built pieces of functionality—called actions—in your workflow. Think of it as a way to reuse existing tasks that someone else has already created, so you don’t have to reinvent the wheel every time.</a:t>
+            </a:r>
+            <a:endParaRPr lang="nl-NL" sz="1400" dirty="0"/>
+          </a:p>
+          <a:p>
+            <a:r>
+              <a:rPr lang="en-GB" dirty="0"/>
+              <a:t>Run: </a:t>
+            </a:r>
+            <a:r>
+              <a:rPr lang="en-US" sz="1300" dirty="0"/>
+              <a:t>keyword in GitHub Actions is used to specify a command or a script that should be executed as part of a step within a job. Essentially, it allows you to write commands that you would normally run in a terminal, such as installing dependencies, building your code, or running tests.</a:t>
+            </a:r>
+            <a:endParaRPr lang="en-NL" dirty="0"/>
+          </a:p>
+        </p:txBody>
+      </p:sp>
+      <p:pic>
+        <p:nvPicPr>
+          <p:cNvPr id="17" name="Picture 16">
+            <a:extLst>
+              <a:ext uri="{FF2B5EF4-FFF2-40B4-BE49-F238E27FC236}">
+                <a16:creationId xmlns:a16="http://schemas.microsoft.com/office/drawing/2014/main" id="{A3D69D54-07C5-DDB3-E61F-0C03E89DF72A}"/>
+              </a:ext>
+            </a:extLst>
+          </p:cNvPr>
+          <p:cNvPicPr>
+            <a:picLocks noChangeAspect="1"/>
+          </p:cNvPicPr>
+          <p:nvPr/>
+        </p:nvPicPr>
+        <p:blipFill>
+          <a:blip r:embed="rId3"/>
+          <a:stretch>
+            <a:fillRect/>
+          </a:stretch>
+        </p:blipFill>
+        <p:spPr>
+          <a:xfrm>
+            <a:off x="56250" y="1331213"/>
+            <a:ext cx="6340001" cy="5489513"/>
+          </a:xfrm>
+          <a:prstGeom prst="rect">
+            <a:avLst/>
+          </a:prstGeom>
+        </p:spPr>
+      </p:pic>
     </p:spTree>
     <p:extLst>
       <p:ext uri="{BB962C8B-B14F-4D97-AF65-F5344CB8AC3E}">
-        <p14:creationId xmlns:p14="http://schemas.microsoft.com/office/powerpoint/2010/main" val="3970810213"/>
+        <p14:creationId xmlns:p14="http://schemas.microsoft.com/office/powerpoint/2010/main" val="3226292005"/>
+      </p:ext>
+    </p:extLst>
+  </p:cSld>
+  <p:clrMapOvr>
+    <a:masterClrMapping/>
+  </p:clrMapOvr>
+</p:sld>
+</file>
+
+<file path=ppt/slides/slide8.xml><?xml version="1.0" encoding="utf-8"?>
+<p:sld xmlns:a="http://schemas.openxmlformats.org/drawingml/2006/main" xmlns:r="http://schemas.openxmlformats.org/officeDocument/2006/relationships" xmlns:p="http://schemas.openxmlformats.org/presentationml/2006/main">
+  <p:cSld>
+    <p:spTree>
+      <p:nvGrpSpPr>
+        <p:cNvPr id="1" name=""/>
+        <p:cNvGrpSpPr/>
+        <p:nvPr/>
+      </p:nvGrpSpPr>
+      <p:grpSpPr>
+        <a:xfrm>
+          <a:off x="0" y="0"/>
+          <a:ext cx="0" cy="0"/>
+          <a:chOff x="0" y="0"/>
+          <a:chExt cx="0" cy="0"/>
+        </a:xfrm>
+      </p:grpSpPr>
+      <p:sp>
+        <p:nvSpPr>
+          <p:cNvPr id="2" name="Title 1">
+            <a:extLst>
+              <a:ext uri="{FF2B5EF4-FFF2-40B4-BE49-F238E27FC236}">
+                <a16:creationId xmlns:a16="http://schemas.microsoft.com/office/drawing/2014/main" id="{E459A7E4-7A9B-E4F4-D31C-8BF42E0668F1}"/>
+              </a:ext>
+            </a:extLst>
+          </p:cNvPr>
+          <p:cNvSpPr>
+            <a:spLocks noGrp="1"/>
+          </p:cNvSpPr>
+          <p:nvPr>
+            <p:ph type="title"/>
+          </p:nvPr>
+        </p:nvSpPr>
+        <p:spPr/>
+        <p:txBody>
+          <a:bodyPr/>
+          <a:lstStyle/>
+          <a:p>
+            <a:r>
+              <a:rPr lang="en-US" dirty="0"/>
+              <a:t>Different Environments in a GitHub Actions Workflow</a:t>
+            </a:r>
+            <a:endParaRPr lang="en-NL" dirty="0"/>
+          </a:p>
+        </p:txBody>
+      </p:sp>
+      <p:sp>
+        <p:nvSpPr>
+          <p:cNvPr id="3" name="Text Placeholder 2">
+            <a:extLst>
+              <a:ext uri="{FF2B5EF4-FFF2-40B4-BE49-F238E27FC236}">
+                <a16:creationId xmlns:a16="http://schemas.microsoft.com/office/drawing/2014/main" id="{E0D34926-E10C-14D2-4D42-792A0B1B95F7}"/>
+              </a:ext>
+            </a:extLst>
+          </p:cNvPr>
+          <p:cNvSpPr>
+            <a:spLocks noGrp="1"/>
+          </p:cNvSpPr>
+          <p:nvPr>
+            <p:ph type="body" idx="1"/>
+          </p:nvPr>
+        </p:nvSpPr>
+        <p:spPr/>
+        <p:txBody>
+          <a:bodyPr/>
+          <a:lstStyle/>
+          <a:p>
+            <a:r>
+              <a:rPr lang="en-GB" dirty="0"/>
+              <a:t>Development</a:t>
+            </a:r>
+            <a:endParaRPr lang="en-NL" dirty="0"/>
+          </a:p>
+        </p:txBody>
+      </p:sp>
+      <p:sp>
+        <p:nvSpPr>
+          <p:cNvPr id="4" name="Text Placeholder 3">
+            <a:extLst>
+              <a:ext uri="{FF2B5EF4-FFF2-40B4-BE49-F238E27FC236}">
+                <a16:creationId xmlns:a16="http://schemas.microsoft.com/office/drawing/2014/main" id="{8A848C59-045F-B7FE-89D4-2EE958A79B78}"/>
+              </a:ext>
+            </a:extLst>
+          </p:cNvPr>
+          <p:cNvSpPr>
+            <a:spLocks noGrp="1"/>
+          </p:cNvSpPr>
+          <p:nvPr>
+            <p:ph type="body" sz="half" idx="15"/>
+          </p:nvPr>
+        </p:nvSpPr>
+        <p:spPr/>
+        <p:txBody>
+          <a:bodyPr>
+            <a:normAutofit/>
+          </a:bodyPr>
+          <a:lstStyle/>
+          <a:p>
+            <a:pPr>
+              <a:buFontTx/>
+              <a:buChar char="-"/>
+            </a:pPr>
+            <a:r>
+              <a:rPr lang="en-GB" sz="1800" dirty="0"/>
+              <a:t> Good to run unit tests </a:t>
+            </a:r>
+          </a:p>
+          <a:p>
+            <a:pPr>
+              <a:buFontTx/>
+              <a:buChar char="-"/>
+            </a:pPr>
+            <a:r>
+              <a:rPr lang="en-GB" sz="1800" dirty="0"/>
+              <a:t> Linting &amp; code analysis</a:t>
+            </a:r>
+          </a:p>
+          <a:p>
+            <a:endParaRPr lang="en-NL" sz="1800" dirty="0"/>
+          </a:p>
+        </p:txBody>
+      </p:sp>
+      <p:sp>
+        <p:nvSpPr>
+          <p:cNvPr id="5" name="Text Placeholder 4">
+            <a:extLst>
+              <a:ext uri="{FF2B5EF4-FFF2-40B4-BE49-F238E27FC236}">
+                <a16:creationId xmlns:a16="http://schemas.microsoft.com/office/drawing/2014/main" id="{B149F22B-E2B1-D8E9-2598-FE4D8B59B90C}"/>
+              </a:ext>
+            </a:extLst>
+          </p:cNvPr>
+          <p:cNvSpPr>
+            <a:spLocks noGrp="1"/>
+          </p:cNvSpPr>
+          <p:nvPr>
+            <p:ph type="body" sz="quarter" idx="3"/>
+          </p:nvPr>
+        </p:nvSpPr>
+        <p:spPr/>
+        <p:txBody>
+          <a:bodyPr/>
+          <a:lstStyle/>
+          <a:p>
+            <a:r>
+              <a:rPr lang="en-GB" dirty="0"/>
+              <a:t>Staging</a:t>
+            </a:r>
+          </a:p>
+        </p:txBody>
+      </p:sp>
+      <p:sp>
+        <p:nvSpPr>
+          <p:cNvPr id="6" name="Text Placeholder 5">
+            <a:extLst>
+              <a:ext uri="{FF2B5EF4-FFF2-40B4-BE49-F238E27FC236}">
+                <a16:creationId xmlns:a16="http://schemas.microsoft.com/office/drawing/2014/main" id="{6399CD3C-C749-6EA6-8917-E9F04E7E3E6B}"/>
+              </a:ext>
+            </a:extLst>
+          </p:cNvPr>
+          <p:cNvSpPr>
+            <a:spLocks noGrp="1"/>
+          </p:cNvSpPr>
+          <p:nvPr>
+            <p:ph type="body" sz="half" idx="16"/>
+          </p:nvPr>
+        </p:nvSpPr>
+        <p:spPr/>
+        <p:txBody>
+          <a:bodyPr/>
+          <a:lstStyle/>
+          <a:p>
+            <a:pPr>
+              <a:buFontTx/>
+              <a:buChar char="-"/>
+            </a:pPr>
+            <a:r>
+              <a:rPr lang="en-GB" sz="1800" dirty="0"/>
+              <a:t> Runs integration and end-to-  end tests</a:t>
+            </a:r>
+          </a:p>
+          <a:p>
+            <a:pPr>
+              <a:buFontTx/>
+              <a:buChar char="-"/>
+            </a:pPr>
+            <a:r>
+              <a:rPr lang="en-GB" sz="1800" dirty="0"/>
+              <a:t> Deploys to staging server</a:t>
+            </a:r>
+            <a:endParaRPr lang="en-US" sz="1800" dirty="0"/>
+          </a:p>
+          <a:p>
+            <a:pPr>
+              <a:buFontTx/>
+              <a:buChar char="-"/>
+            </a:pPr>
+            <a:r>
+              <a:rPr lang="nl-NL" sz="1800" dirty="0"/>
+              <a:t> Simulate User Scenarios</a:t>
+            </a:r>
+          </a:p>
+          <a:p>
+            <a:pPr>
+              <a:buFontTx/>
+              <a:buChar char="-"/>
+            </a:pPr>
+            <a:r>
+              <a:rPr lang="nl-NL" sz="1800" dirty="0"/>
+              <a:t> Smoke Testing </a:t>
+            </a:r>
+            <a:endParaRPr lang="en-US" sz="1800" dirty="0"/>
+          </a:p>
+          <a:p>
+            <a:endParaRPr lang="en-NL" dirty="0"/>
+          </a:p>
+        </p:txBody>
+      </p:sp>
+      <p:sp>
+        <p:nvSpPr>
+          <p:cNvPr id="7" name="Text Placeholder 6">
+            <a:extLst>
+              <a:ext uri="{FF2B5EF4-FFF2-40B4-BE49-F238E27FC236}">
+                <a16:creationId xmlns:a16="http://schemas.microsoft.com/office/drawing/2014/main" id="{8EA2603F-F622-3204-F9AD-E7193C8CA673}"/>
+              </a:ext>
+            </a:extLst>
+          </p:cNvPr>
+          <p:cNvSpPr>
+            <a:spLocks noGrp="1"/>
+          </p:cNvSpPr>
+          <p:nvPr>
+            <p:ph type="body" sz="quarter" idx="13"/>
+          </p:nvPr>
+        </p:nvSpPr>
+        <p:spPr/>
+        <p:txBody>
+          <a:bodyPr/>
+          <a:lstStyle/>
+          <a:p>
+            <a:r>
+              <a:rPr lang="en-GB" dirty="0"/>
+              <a:t>Production</a:t>
+            </a:r>
+          </a:p>
+        </p:txBody>
+      </p:sp>
+      <p:sp>
+        <p:nvSpPr>
+          <p:cNvPr id="8" name="Text Placeholder 7">
+            <a:extLst>
+              <a:ext uri="{FF2B5EF4-FFF2-40B4-BE49-F238E27FC236}">
+                <a16:creationId xmlns:a16="http://schemas.microsoft.com/office/drawing/2014/main" id="{4577D4D5-E501-B21A-ED11-EBDDC2F5718A}"/>
+              </a:ext>
+            </a:extLst>
+          </p:cNvPr>
+          <p:cNvSpPr>
+            <a:spLocks noGrp="1"/>
+          </p:cNvSpPr>
+          <p:nvPr>
+            <p:ph type="body" sz="half" idx="17"/>
+          </p:nvPr>
+        </p:nvSpPr>
+        <p:spPr/>
+        <p:txBody>
+          <a:bodyPr/>
+          <a:lstStyle/>
+          <a:p>
+            <a:pPr>
+              <a:buFontTx/>
+              <a:buChar char="-"/>
+            </a:pPr>
+            <a:r>
+              <a:rPr lang="nl-NL" sz="1800" dirty="0"/>
+              <a:t> Deploy Final Code</a:t>
+            </a:r>
+            <a:endParaRPr lang="en-GB" sz="1800" dirty="0"/>
+          </a:p>
+          <a:p>
+            <a:pPr>
+              <a:buFontTx/>
+              <a:buChar char="-"/>
+            </a:pPr>
+            <a:r>
+              <a:rPr lang="nl-NL" sz="1800" dirty="0"/>
+              <a:t> Trigger Alerts for Issues</a:t>
+            </a:r>
+          </a:p>
+          <a:p>
+            <a:pPr>
+              <a:buFontTx/>
+              <a:buChar char="-"/>
+            </a:pPr>
+            <a:r>
+              <a:rPr lang="en-GB" sz="1800" dirty="0"/>
+              <a:t> Send notification on release</a:t>
+            </a:r>
+          </a:p>
+          <a:p>
+            <a:pPr>
+              <a:buFontTx/>
+              <a:buChar char="-"/>
+            </a:pPr>
+            <a:r>
+              <a:rPr lang="nl-NL" sz="1800" dirty="0"/>
+              <a:t> Automated Rollbacks</a:t>
+            </a:r>
+          </a:p>
+          <a:p>
+            <a:endParaRPr lang="en-NL" dirty="0"/>
+          </a:p>
+        </p:txBody>
+      </p:sp>
+    </p:spTree>
+    <p:extLst>
+      <p:ext uri="{BB962C8B-B14F-4D97-AF65-F5344CB8AC3E}">
+        <p14:creationId xmlns:p14="http://schemas.microsoft.com/office/powerpoint/2010/main" val="629369477"/>
+      </p:ext>
+    </p:extLst>
+  </p:cSld>
+  <p:clrMapOvr>
+    <a:masterClrMapping/>
+  </p:clrMapOvr>
+</p:sld>
+</file>
+
+<file path=ppt/slides/slide9.xml><?xml version="1.0" encoding="utf-8"?>
+<p:sld xmlns:a="http://schemas.openxmlformats.org/drawingml/2006/main" xmlns:r="http://schemas.openxmlformats.org/officeDocument/2006/relationships" xmlns:p="http://schemas.openxmlformats.org/presentationml/2006/main">
+  <p:cSld>
+    <p:spTree>
+      <p:nvGrpSpPr>
+        <p:cNvPr id="1" name=""/>
+        <p:cNvGrpSpPr/>
+        <p:nvPr/>
+      </p:nvGrpSpPr>
+      <p:grpSpPr>
+        <a:xfrm>
+          <a:off x="0" y="0"/>
+          <a:ext cx="0" cy="0"/>
+          <a:chOff x="0" y="0"/>
+          <a:chExt cx="0" cy="0"/>
+        </a:xfrm>
+      </p:grpSpPr>
+      <p:sp>
+        <p:nvSpPr>
+          <p:cNvPr id="2" name="Title 1">
+            <a:extLst>
+              <a:ext uri="{FF2B5EF4-FFF2-40B4-BE49-F238E27FC236}">
+                <a16:creationId xmlns:a16="http://schemas.microsoft.com/office/drawing/2014/main" id="{371173F2-604B-E34A-94F4-18FD75AAF440}"/>
+              </a:ext>
+            </a:extLst>
+          </p:cNvPr>
+          <p:cNvSpPr>
+            <a:spLocks noGrp="1"/>
+          </p:cNvSpPr>
+          <p:nvPr>
+            <p:ph type="title"/>
+          </p:nvPr>
+        </p:nvSpPr>
+        <p:spPr>
+          <a:xfrm>
+            <a:off x="646111" y="452718"/>
+            <a:ext cx="9960929" cy="1400530"/>
+          </a:xfrm>
+        </p:spPr>
+        <p:txBody>
+          <a:bodyPr/>
+          <a:lstStyle/>
+          <a:p>
+            <a:r>
+              <a:rPr lang="nl-NL" dirty="0"/>
+              <a:t>Self-Hosted Runners vs. GitHub-Hosted Runners</a:t>
+            </a:r>
+            <a:endParaRPr lang="en-NL" dirty="0"/>
+          </a:p>
+        </p:txBody>
+      </p:sp>
+      <p:sp>
+        <p:nvSpPr>
+          <p:cNvPr id="4" name="Text Placeholder 3">
+            <a:extLst>
+              <a:ext uri="{FF2B5EF4-FFF2-40B4-BE49-F238E27FC236}">
+                <a16:creationId xmlns:a16="http://schemas.microsoft.com/office/drawing/2014/main" id="{8C87645E-9076-E2C6-9B90-02E19FE6EA0A}"/>
+              </a:ext>
+            </a:extLst>
+          </p:cNvPr>
+          <p:cNvSpPr>
+            <a:spLocks noGrp="1"/>
+          </p:cNvSpPr>
+          <p:nvPr>
+            <p:ph type="body" idx="1"/>
+          </p:nvPr>
+        </p:nvSpPr>
+        <p:spPr/>
+        <p:txBody>
+          <a:bodyPr/>
+          <a:lstStyle/>
+          <a:p>
+            <a:r>
+              <a:rPr lang="nl-NL" dirty="0"/>
+              <a:t>GitHub-Hosted Runners</a:t>
+            </a:r>
+            <a:endParaRPr lang="en-NL" dirty="0"/>
+          </a:p>
+        </p:txBody>
+      </p:sp>
+      <p:sp>
+        <p:nvSpPr>
+          <p:cNvPr id="5" name="Content Placeholder 4">
+            <a:extLst>
+              <a:ext uri="{FF2B5EF4-FFF2-40B4-BE49-F238E27FC236}">
+                <a16:creationId xmlns:a16="http://schemas.microsoft.com/office/drawing/2014/main" id="{22754D1D-3174-A634-FE35-D27787DC4134}"/>
+              </a:ext>
+            </a:extLst>
+          </p:cNvPr>
+          <p:cNvSpPr>
+            <a:spLocks noGrp="1"/>
+          </p:cNvSpPr>
+          <p:nvPr>
+            <p:ph sz="half" idx="2"/>
+          </p:nvPr>
+        </p:nvSpPr>
+        <p:spPr>
+          <a:xfrm>
+            <a:off x="1103312" y="2514600"/>
+            <a:ext cx="4396339" cy="4425696"/>
+          </a:xfrm>
+        </p:spPr>
+        <p:txBody>
+          <a:bodyPr>
+            <a:normAutofit lnSpcReduction="10000"/>
+          </a:bodyPr>
+          <a:lstStyle/>
+          <a:p>
+            <a:r>
+              <a:rPr lang="en-US" dirty="0"/>
+              <a:t>Managed by GitHub: Provided and maintained by GitHub.</a:t>
+            </a:r>
+          </a:p>
+          <a:p>
+            <a:r>
+              <a:rPr lang="en-US" dirty="0"/>
+              <a:t>Pre-Installed Tools: Comes with popular tools (e.g., Node.js, Python, Java).</a:t>
+            </a:r>
+          </a:p>
+          <a:p>
+            <a:r>
+              <a:rPr lang="en-US" dirty="0"/>
+              <a:t>Ease of Use: No setup required—ready to use.</a:t>
+            </a:r>
+          </a:p>
+          <a:p>
+            <a:r>
+              <a:rPr lang="en-US" dirty="0"/>
+              <a:t>Resource Limitations: Limited CPU, memory, and usage quotas.</a:t>
+            </a:r>
+          </a:p>
+          <a:p>
+            <a:r>
+              <a:rPr lang="en-US" dirty="0"/>
+              <a:t>Scenarios: Best for typical CI/CD tasks, rapid prototyping, open source projects.</a:t>
+            </a:r>
+          </a:p>
+          <a:p>
+            <a:endParaRPr lang="en-NL" dirty="0"/>
+          </a:p>
+        </p:txBody>
+      </p:sp>
+      <p:sp>
+        <p:nvSpPr>
+          <p:cNvPr id="6" name="Text Placeholder 5">
+            <a:extLst>
+              <a:ext uri="{FF2B5EF4-FFF2-40B4-BE49-F238E27FC236}">
+                <a16:creationId xmlns:a16="http://schemas.microsoft.com/office/drawing/2014/main" id="{BEBF5104-AB99-45F4-E3D6-8BD6A4B66343}"/>
+              </a:ext>
+            </a:extLst>
+          </p:cNvPr>
+          <p:cNvSpPr>
+            <a:spLocks noGrp="1"/>
+          </p:cNvSpPr>
+          <p:nvPr>
+            <p:ph type="body" sz="quarter" idx="3"/>
+          </p:nvPr>
+        </p:nvSpPr>
+        <p:spPr/>
+        <p:txBody>
+          <a:bodyPr/>
+          <a:lstStyle/>
+          <a:p>
+            <a:r>
+              <a:rPr lang="nl-NL" dirty="0"/>
+              <a:t>Self-Hosted Runners</a:t>
+            </a:r>
+          </a:p>
+        </p:txBody>
+      </p:sp>
+      <p:sp>
+        <p:nvSpPr>
+          <p:cNvPr id="7" name="Content Placeholder 6">
+            <a:extLst>
+              <a:ext uri="{FF2B5EF4-FFF2-40B4-BE49-F238E27FC236}">
+                <a16:creationId xmlns:a16="http://schemas.microsoft.com/office/drawing/2014/main" id="{B534F9CA-C55A-01D9-39A0-FF18CC81BB4F}"/>
+              </a:ext>
+            </a:extLst>
+          </p:cNvPr>
+          <p:cNvSpPr>
+            <a:spLocks noGrp="1"/>
+          </p:cNvSpPr>
+          <p:nvPr>
+            <p:ph sz="quarter" idx="4"/>
+          </p:nvPr>
+        </p:nvSpPr>
+        <p:spPr>
+          <a:xfrm>
+            <a:off x="5654495" y="2514600"/>
+            <a:ext cx="4396339" cy="4425696"/>
+          </a:xfrm>
+        </p:spPr>
+        <p:txBody>
+          <a:bodyPr>
+            <a:normAutofit lnSpcReduction="10000"/>
+          </a:bodyPr>
+          <a:lstStyle/>
+          <a:p>
+            <a:r>
+              <a:rPr lang="en-US" dirty="0"/>
+              <a:t>Managed by You: Installed and maintained on your own infrastructure.</a:t>
+            </a:r>
+          </a:p>
+          <a:p>
+            <a:r>
+              <a:rPr lang="en-US" dirty="0"/>
+              <a:t>Custom Environment: Full control over hardware, operating system, and software.</a:t>
+            </a:r>
+          </a:p>
+          <a:p>
+            <a:r>
+              <a:rPr lang="en-US" dirty="0"/>
+              <a:t>“Unlimited” Resources: No quotas or limits; can be configured as needed.</a:t>
+            </a:r>
+          </a:p>
+          <a:p>
+            <a:r>
+              <a:rPr lang="en-US" dirty="0"/>
+              <a:t>Cost Savings: Utilize existing infrastructure, potentially reducing costs for large projects.</a:t>
+            </a:r>
+          </a:p>
+          <a:p>
+            <a:r>
+              <a:rPr lang="en-US" dirty="0"/>
+              <a:t>Scenarios: Suitable for custom requirements, large workloads, privacy-sensitive projects.</a:t>
+            </a:r>
+          </a:p>
+          <a:p>
+            <a:endParaRPr lang="en-NL" dirty="0"/>
+          </a:p>
+        </p:txBody>
+      </p:sp>
+    </p:spTree>
+    <p:extLst>
+      <p:ext uri="{BB962C8B-B14F-4D97-AF65-F5344CB8AC3E}">
+        <p14:creationId xmlns:p14="http://schemas.microsoft.com/office/powerpoint/2010/main" val="884713140"/>
       </p:ext>
     </p:extLst>
   </p:cSld>
@@ -8719,4 +10226,339 @@
     </a:ext>
   </a:extLst>
 </a:theme>
+</file>
+
+<file path=ppt/theme/theme2.xml><?xml version="1.0" encoding="utf-8"?>
+<a:theme xmlns:a="http://schemas.openxmlformats.org/drawingml/2006/main" name="Office Theme">
+  <a:themeElements>
+    <a:clrScheme name="Office">
+      <a:dk1>
+        <a:sysClr val="windowText" lastClr="000000"/>
+      </a:dk1>
+      <a:lt1>
+        <a:sysClr val="window" lastClr="FFFFFF"/>
+      </a:lt1>
+      <a:dk2>
+        <a:srgbClr val="0E2841"/>
+      </a:dk2>
+      <a:lt2>
+        <a:srgbClr val="E8E8E8"/>
+      </a:lt2>
+      <a:accent1>
+        <a:srgbClr val="156082"/>
+      </a:accent1>
+      <a:accent2>
+        <a:srgbClr val="E97132"/>
+      </a:accent2>
+      <a:accent3>
+        <a:srgbClr val="196B24"/>
+      </a:accent3>
+      <a:accent4>
+        <a:srgbClr val="0F9ED5"/>
+      </a:accent4>
+      <a:accent5>
+        <a:srgbClr val="A02B93"/>
+      </a:accent5>
+      <a:accent6>
+        <a:srgbClr val="4EA72E"/>
+      </a:accent6>
+      <a:hlink>
+        <a:srgbClr val="467886"/>
+      </a:hlink>
+      <a:folHlink>
+        <a:srgbClr val="96607D"/>
+      </a:folHlink>
+    </a:clrScheme>
+    <a:fontScheme name="Office">
+      <a:majorFont>
+        <a:latin typeface="Aptos Display" panose="02110004020202020204"/>
+        <a:ea typeface=""/>
+        <a:cs typeface=""/>
+        <a:font script="Jpan" typeface="游ゴシック Light"/>
+        <a:font script="Hang" typeface="맑은 고딕"/>
+        <a:font script="Hans" typeface="等线 Light"/>
+        <a:font script="Hant" typeface="新細明體"/>
+        <a:font script="Arab" typeface="Times New Roman"/>
+        <a:font script="Hebr" typeface="Times New Roman"/>
+        <a:font script="Thai" typeface="Angsana New"/>
+        <a:font script="Ethi" typeface="Nyala"/>
+        <a:font script="Beng" typeface="Vrinda"/>
+        <a:font script="Gujr" typeface="Shruti"/>
+        <a:font script="Khmr" typeface="MoolBoran"/>
+        <a:font script="Knda" typeface="Tunga"/>
+        <a:font script="Guru" typeface="Raavi"/>
+        <a:font script="Cans" typeface="Euphemia"/>
+        <a:font script="Cher" typeface="Plantagenet Cherokee"/>
+        <a:font script="Yiii" typeface="Microsoft Yi Baiti"/>
+        <a:font script="Tibt" typeface="Microsoft Himalaya"/>
+        <a:font script="Thaa" typeface="MV Boli"/>
+        <a:font script="Deva" typeface="Mangal"/>
+        <a:font script="Telu" typeface="Gautami"/>
+        <a:font script="Taml" typeface="Latha"/>
+        <a:font script="Syrc" typeface="Estrangelo Edessa"/>
+        <a:font script="Orya" typeface="Kalinga"/>
+        <a:font script="Mlym" typeface="Kartika"/>
+        <a:font script="Laoo" typeface="DokChampa"/>
+        <a:font script="Sinh" typeface="Iskoola Pota"/>
+        <a:font script="Mong" typeface="Mongolian Baiti"/>
+        <a:font script="Viet" typeface="Times New Roman"/>
+        <a:font script="Uigh" typeface="Microsoft Uighur"/>
+        <a:font script="Geor" typeface="Sylfaen"/>
+        <a:font script="Armn" typeface="Arial"/>
+        <a:font script="Bugi" typeface="Leelawadee UI"/>
+        <a:font script="Bopo" typeface="Microsoft JhengHei"/>
+        <a:font script="Java" typeface="Javanese Text"/>
+        <a:font script="Lisu" typeface="Segoe UI"/>
+        <a:font script="Mymr" typeface="Myanmar Text"/>
+        <a:font script="Nkoo" typeface="Ebrima"/>
+        <a:font script="Olck" typeface="Nirmala UI"/>
+        <a:font script="Osma" typeface="Ebrima"/>
+        <a:font script="Phag" typeface="Phagspa"/>
+        <a:font script="Syrn" typeface="Estrangelo Edessa"/>
+        <a:font script="Syrj" typeface="Estrangelo Edessa"/>
+        <a:font script="Syre" typeface="Estrangelo Edessa"/>
+        <a:font script="Sora" typeface="Nirmala UI"/>
+        <a:font script="Tale" typeface="Microsoft Tai Le"/>
+        <a:font script="Talu" typeface="Microsoft New Tai Lue"/>
+        <a:font script="Tfng" typeface="Ebrima"/>
+      </a:majorFont>
+      <a:minorFont>
+        <a:latin typeface="Aptos" panose="02110004020202020204"/>
+        <a:ea typeface=""/>
+        <a:cs typeface=""/>
+        <a:font script="Jpan" typeface="游ゴシック"/>
+        <a:font script="Hang" typeface="맑은 고딕"/>
+        <a:font script="Hans" typeface="等线"/>
+        <a:font script="Hant" typeface="新細明體"/>
+        <a:font script="Arab" typeface="Arial"/>
+        <a:font script="Hebr" typeface="Arial"/>
+        <a:font script="Thai" typeface="Cordia New"/>
+        <a:font script="Ethi" typeface="Nyala"/>
+        <a:font script="Beng" typeface="Vrinda"/>
+        <a:font script="Gujr" typeface="Shruti"/>
+        <a:font script="Khmr" typeface="DaunPenh"/>
+        <a:font script="Knda" typeface="Tunga"/>
+        <a:font script="Guru" typeface="Raavi"/>
+        <a:font script="Cans" typeface="Euphemia"/>
+        <a:font script="Cher" typeface="Plantagenet Cherokee"/>
+        <a:font script="Yiii" typeface="Microsoft Yi Baiti"/>
+        <a:font script="Tibt" typeface="Microsoft Himalaya"/>
+        <a:font script="Thaa" typeface="MV Boli"/>
+        <a:font script="Deva" typeface="Mangal"/>
+        <a:font script="Telu" typeface="Gautami"/>
+        <a:font script="Taml" typeface="Latha"/>
+        <a:font script="Syrc" typeface="Estrangelo Edessa"/>
+        <a:font script="Orya" typeface="Kalinga"/>
+        <a:font script="Mlym" typeface="Kartika"/>
+        <a:font script="Laoo" typeface="DokChampa"/>
+        <a:font script="Sinh" typeface="Iskoola Pota"/>
+        <a:font script="Mong" typeface="Mongolian Baiti"/>
+        <a:font script="Viet" typeface="Arial"/>
+        <a:font script="Uigh" typeface="Microsoft Uighur"/>
+        <a:font script="Geor" typeface="Sylfaen"/>
+        <a:font script="Armn" typeface="Arial"/>
+        <a:font script="Bugi" typeface="Leelawadee UI"/>
+        <a:font script="Bopo" typeface="Microsoft JhengHei"/>
+        <a:font script="Java" typeface="Javanese Text"/>
+        <a:font script="Lisu" typeface="Segoe UI"/>
+        <a:font script="Mymr" typeface="Myanmar Text"/>
+        <a:font script="Nkoo" typeface="Ebrima"/>
+        <a:font script="Olck" typeface="Nirmala UI"/>
+        <a:font script="Osma" typeface="Ebrima"/>
+        <a:font script="Phag" typeface="Phagspa"/>
+        <a:font script="Syrn" typeface="Estrangelo Edessa"/>
+        <a:font script="Syrj" typeface="Estrangelo Edessa"/>
+        <a:font script="Syre" typeface="Estrangelo Edessa"/>
+        <a:font script="Sora" typeface="Nirmala UI"/>
+        <a:font script="Tale" typeface="Microsoft Tai Le"/>
+        <a:font script="Talu" typeface="Microsoft New Tai Lue"/>
+        <a:font script="Tfng" typeface="Ebrima"/>
+      </a:minorFont>
+    </a:fontScheme>
+    <a:fmtScheme name="Office">
+      <a:fillStyleLst>
+        <a:solidFill>
+          <a:schemeClr val="phClr"/>
+        </a:solidFill>
+        <a:gradFill rotWithShape="1">
+          <a:gsLst>
+            <a:gs pos="0">
+              <a:schemeClr val="phClr">
+                <a:lumMod val="110000"/>
+                <a:satMod val="105000"/>
+                <a:tint val="67000"/>
+              </a:schemeClr>
+            </a:gs>
+            <a:gs pos="50000">
+              <a:schemeClr val="phClr">
+                <a:lumMod val="105000"/>
+                <a:satMod val="103000"/>
+                <a:tint val="73000"/>
+              </a:schemeClr>
+            </a:gs>
+            <a:gs pos="100000">
+              <a:schemeClr val="phClr">
+                <a:lumMod val="105000"/>
+                <a:satMod val="109000"/>
+                <a:tint val="81000"/>
+              </a:schemeClr>
+            </a:gs>
+          </a:gsLst>
+          <a:lin ang="5400000" scaled="0"/>
+        </a:gradFill>
+        <a:gradFill rotWithShape="1">
+          <a:gsLst>
+            <a:gs pos="0">
+              <a:schemeClr val="phClr">
+                <a:satMod val="103000"/>
+                <a:lumMod val="102000"/>
+                <a:tint val="94000"/>
+              </a:schemeClr>
+            </a:gs>
+            <a:gs pos="50000">
+              <a:schemeClr val="phClr">
+                <a:satMod val="110000"/>
+                <a:lumMod val="100000"/>
+                <a:shade val="100000"/>
+              </a:schemeClr>
+            </a:gs>
+            <a:gs pos="100000">
+              <a:schemeClr val="phClr">
+                <a:lumMod val="99000"/>
+                <a:satMod val="120000"/>
+                <a:shade val="78000"/>
+              </a:schemeClr>
+            </a:gs>
+          </a:gsLst>
+          <a:lin ang="5400000" scaled="0"/>
+        </a:gradFill>
+      </a:fillStyleLst>
+      <a:lnStyleLst>
+        <a:ln w="12700" cap="flat" cmpd="sng" algn="ctr">
+          <a:solidFill>
+            <a:schemeClr val="phClr"/>
+          </a:solidFill>
+          <a:prstDash val="solid"/>
+          <a:miter lim="800000"/>
+        </a:ln>
+        <a:ln w="19050" cap="flat" cmpd="sng" algn="ctr">
+          <a:solidFill>
+            <a:schemeClr val="phClr"/>
+          </a:solidFill>
+          <a:prstDash val="solid"/>
+          <a:miter lim="800000"/>
+        </a:ln>
+        <a:ln w="25400" cap="flat" cmpd="sng" algn="ctr">
+          <a:solidFill>
+            <a:schemeClr val="phClr"/>
+          </a:solidFill>
+          <a:prstDash val="solid"/>
+          <a:miter lim="800000"/>
+        </a:ln>
+      </a:lnStyleLst>
+      <a:effectStyleLst>
+        <a:effectStyle>
+          <a:effectLst/>
+        </a:effectStyle>
+        <a:effectStyle>
+          <a:effectLst/>
+        </a:effectStyle>
+        <a:effectStyle>
+          <a:effectLst>
+            <a:outerShdw blurRad="57150" dist="19050" dir="5400000" algn="ctr" rotWithShape="0">
+              <a:srgbClr val="000000">
+                <a:alpha val="63000"/>
+              </a:srgbClr>
+            </a:outerShdw>
+          </a:effectLst>
+        </a:effectStyle>
+      </a:effectStyleLst>
+      <a:bgFillStyleLst>
+        <a:solidFill>
+          <a:schemeClr val="phClr"/>
+        </a:solidFill>
+        <a:solidFill>
+          <a:schemeClr val="phClr">
+            <a:tint val="95000"/>
+            <a:satMod val="170000"/>
+          </a:schemeClr>
+        </a:solidFill>
+        <a:gradFill rotWithShape="1">
+          <a:gsLst>
+            <a:gs pos="0">
+              <a:schemeClr val="phClr">
+                <a:tint val="93000"/>
+                <a:satMod val="150000"/>
+                <a:shade val="98000"/>
+                <a:lumMod val="102000"/>
+              </a:schemeClr>
+            </a:gs>
+            <a:gs pos="50000">
+              <a:schemeClr val="phClr">
+                <a:tint val="98000"/>
+                <a:satMod val="130000"/>
+                <a:shade val="90000"/>
+                <a:lumMod val="103000"/>
+              </a:schemeClr>
+            </a:gs>
+            <a:gs pos="100000">
+              <a:schemeClr val="phClr">
+                <a:shade val="63000"/>
+                <a:satMod val="120000"/>
+              </a:schemeClr>
+            </a:gs>
+          </a:gsLst>
+          <a:lin ang="5400000" scaled="0"/>
+        </a:gradFill>
+      </a:bgFillStyleLst>
+    </a:fmtScheme>
+  </a:themeElements>
+  <a:objectDefaults>
+    <a:lnDef>
+      <a:spPr/>
+      <a:bodyPr/>
+      <a:lstStyle/>
+      <a:style>
+        <a:lnRef idx="2">
+          <a:schemeClr val="accent1"/>
+        </a:lnRef>
+        <a:fillRef idx="0">
+          <a:schemeClr val="accent1"/>
+        </a:fillRef>
+        <a:effectRef idx="1">
+          <a:schemeClr val="accent1"/>
+        </a:effectRef>
+        <a:fontRef idx="minor">
+          <a:schemeClr val="tx1"/>
+        </a:fontRef>
+      </a:style>
+    </a:lnDef>
+  </a:objectDefaults>
+  <a:extraClrSchemeLst/>
+  <a:extLst>
+    <a:ext uri="{05A4C25C-085E-4340-85A3-A5531E510DB2}">
+      <thm15:themeFamily xmlns:thm15="http://schemas.microsoft.com/office/thememl/2012/main" name="Office Theme" id="{2E142A2C-CD16-42D6-873A-C26D2A0506FA}" vid="{1BDDFF52-6CD6-40A5-AB3C-68EB2F1E4D0A}"/>
+    </a:ext>
+  </a:extLst>
+</a:theme>
+</file>
+
+<file path=ppt/webextensions/taskpanes.xml><?xml version="1.0" encoding="utf-8"?>
+<wetp:taskpanes xmlns:wetp="http://schemas.microsoft.com/office/webextensions/taskpanes/2010/11">
+  <wetp:taskpane dockstate="right" visibility="0" width="438" row="2">
+    <wetp:webextensionref xmlns:r="http://schemas.openxmlformats.org/officeDocument/2006/relationships" r:id="rId1"/>
+  </wetp:taskpane>
+</wetp:taskpanes>
+</file>
+
+<file path=ppt/webextensions/webextension1.xml><?xml version="1.0" encoding="utf-8"?>
+<we:webextension xmlns:we="http://schemas.microsoft.com/office/webextensions/webextension/2010/11" id="{FED73E33-F25F-48A0-9B07-B066B963F885}">
+  <we:reference id="wa200005566" version="3.0.0.2" store="en-US" storeType="OMEX"/>
+  <we:alternateReferences>
+    <we:reference id="wa200005566" version="3.0.0.2" store="wa200005566" storeType="OMEX"/>
+  </we:alternateReferences>
+  <we:properties/>
+  <we:bindings/>
+  <we:snapshot xmlns:r="http://schemas.openxmlformats.org/officeDocument/2006/relationships"/>
+</we:webextension>
 </file>
</xml_diff>

<commit_message>
chore: removed redundant text from presentation
removed text in slide 9.
</commit_message>
<xml_diff>
--- a/Workshop Presentation.pptx
+++ b/Workshop Presentation.pptx
@@ -5,7 +5,7 @@
     <p:sldMasterId id="2147483648" r:id="rId1"/>
   </p:sldMasterIdLst>
   <p:notesMasterIdLst>
-    <p:notesMasterId r:id="rId15"/>
+    <p:notesMasterId r:id="rId14"/>
   </p:notesMasterIdLst>
   <p:sldIdLst>
     <p:sldId id="256" r:id="rId2"/>
@@ -19,8 +19,7 @@
     <p:sldId id="267" r:id="rId10"/>
     <p:sldId id="266" r:id="rId11"/>
     <p:sldId id="268" r:id="rId12"/>
-    <p:sldId id="269" r:id="rId13"/>
-    <p:sldId id="262" r:id="rId14"/>
+    <p:sldId id="262" r:id="rId13"/>
   </p:sldIdLst>
   <p:sldSz cx="12192000" cy="6858000"/>
   <p:notesSz cx="6858000" cy="9144000"/>
@@ -3142,7 +3141,7 @@
           <a:p>
             <a:fld id="{AEA770DF-B3DE-4089-8EA0-E301DFF3F119}" type="datetimeFigureOut">
               <a:rPr lang="en-NL" smtClean="0"/>
-              <a:t>10/11/2024</a:t>
+              <a:t>01/12/2024</a:t>
             </a:fld>
             <a:endParaRPr lang="en-NL"/>
           </a:p>
@@ -3704,7 +3703,7 @@
           <a:p>
             <a:fld id="{4AAD347D-5ACD-4C99-B74B-A9C85AD731AF}" type="datetimeFigureOut">
               <a:rPr lang="en-US" dirty="0"/>
-              <a:t>11/10/2024</a:t>
+              <a:t>12/1/2024</a:t>
             </a:fld>
             <a:endParaRPr lang="en-US" dirty="0"/>
           </a:p>
@@ -3974,7 +3973,7 @@
           <a:p>
             <a:fld id="{4509A250-FF31-4206-8172-F9D3106AACB1}" type="datetimeFigureOut">
               <a:rPr lang="en-US" dirty="0"/>
-              <a:t>11/10/2024</a:t>
+              <a:t>12/1/2024</a:t>
             </a:fld>
             <a:endParaRPr lang="en-US" dirty="0"/>
           </a:p>
@@ -4163,7 +4162,7 @@
           <a:p>
             <a:fld id="{4509A250-FF31-4206-8172-F9D3106AACB1}" type="datetimeFigureOut">
               <a:rPr lang="en-US" dirty="0"/>
-              <a:t>11/10/2024</a:t>
+              <a:t>12/1/2024</a:t>
             </a:fld>
             <a:endParaRPr lang="en-US" dirty="0"/>
           </a:p>
@@ -4429,7 +4428,7 @@
           <a:p>
             <a:fld id="{4509A250-FF31-4206-8172-F9D3106AACB1}" type="datetimeFigureOut">
               <a:rPr lang="en-US" dirty="0"/>
-              <a:t>11/10/2024</a:t>
+              <a:t>12/1/2024</a:t>
             </a:fld>
             <a:endParaRPr lang="en-US" dirty="0"/>
           </a:p>
@@ -4751,7 +4750,7 @@
           <a:p>
             <a:fld id="{4509A250-FF31-4206-8172-F9D3106AACB1}" type="datetimeFigureOut">
               <a:rPr lang="en-US" dirty="0"/>
-              <a:t>11/10/2024</a:t>
+              <a:t>12/1/2024</a:t>
             </a:fld>
             <a:endParaRPr lang="en-US" dirty="0"/>
           </a:p>
@@ -5365,7 +5364,7 @@
           <a:p>
             <a:fld id="{4509A250-FF31-4206-8172-F9D3106AACB1}" type="datetimeFigureOut">
               <a:rPr lang="en-US" dirty="0"/>
-              <a:t>11/10/2024</a:t>
+              <a:t>12/1/2024</a:t>
             </a:fld>
             <a:endParaRPr lang="en-US" dirty="0"/>
           </a:p>
@@ -6207,7 +6206,7 @@
           <a:p>
             <a:fld id="{4509A250-FF31-4206-8172-F9D3106AACB1}" type="datetimeFigureOut">
               <a:rPr lang="en-US" dirty="0"/>
-              <a:t>11/10/2024</a:t>
+              <a:t>12/1/2024</a:t>
             </a:fld>
             <a:endParaRPr lang="en-US" dirty="0"/>
           </a:p>
@@ -6372,7 +6371,7 @@
           <a:p>
             <a:fld id="{4509A250-FF31-4206-8172-F9D3106AACB1}" type="datetimeFigureOut">
               <a:rPr lang="en-US" dirty="0"/>
-              <a:t>11/10/2024</a:t>
+              <a:t>12/1/2024</a:t>
             </a:fld>
             <a:endParaRPr lang="en-US" dirty="0"/>
           </a:p>
@@ -6547,7 +6546,7 @@
           <a:p>
             <a:fld id="{4509A250-FF31-4206-8172-F9D3106AACB1}" type="datetimeFigureOut">
               <a:rPr lang="en-US" dirty="0"/>
-              <a:t>11/10/2024</a:t>
+              <a:t>12/1/2024</a:t>
             </a:fld>
             <a:endParaRPr lang="en-US" dirty="0"/>
           </a:p>
@@ -6712,7 +6711,7 @@
           <a:p>
             <a:fld id="{9796027F-7875-4030-9381-8BD8C4F21935}" type="datetimeFigureOut">
               <a:rPr lang="en-US" dirty="0"/>
-              <a:t>11/10/2024</a:t>
+              <a:t>12/1/2024</a:t>
             </a:fld>
             <a:endParaRPr lang="en-US" dirty="0"/>
           </a:p>
@@ -6954,7 +6953,7 @@
           <a:p>
             <a:fld id="{9796027F-7875-4030-9381-8BD8C4F21935}" type="datetimeFigureOut">
               <a:rPr lang="en-US" dirty="0"/>
-              <a:t>11/10/2024</a:t>
+              <a:t>12/1/2024</a:t>
             </a:fld>
             <a:endParaRPr lang="en-US" dirty="0"/>
           </a:p>
@@ -7241,7 +7240,7 @@
           <a:p>
             <a:fld id="{9796027F-7875-4030-9381-8BD8C4F21935}" type="datetimeFigureOut">
               <a:rPr lang="en-US" dirty="0"/>
-              <a:t>11/10/2024</a:t>
+              <a:t>12/1/2024</a:t>
             </a:fld>
             <a:endParaRPr lang="en-US" dirty="0"/>
           </a:p>
@@ -7680,7 +7679,7 @@
           <a:p>
             <a:fld id="{9796027F-7875-4030-9381-8BD8C4F21935}" type="datetimeFigureOut">
               <a:rPr lang="en-US" dirty="0"/>
-              <a:t>11/10/2024</a:t>
+              <a:t>12/1/2024</a:t>
             </a:fld>
             <a:endParaRPr lang="en-US" dirty="0"/>
           </a:p>
@@ -7793,7 +7792,7 @@
           <a:p>
             <a:fld id="{4509A250-FF31-4206-8172-F9D3106AACB1}" type="datetimeFigureOut">
               <a:rPr lang="en-US" dirty="0"/>
-              <a:t>11/10/2024</a:t>
+              <a:t>12/1/2024</a:t>
             </a:fld>
             <a:endParaRPr lang="en-US" dirty="0"/>
           </a:p>
@@ -7883,7 +7882,7 @@
           <a:p>
             <a:fld id="{4509A250-FF31-4206-8172-F9D3106AACB1}" type="datetimeFigureOut">
               <a:rPr lang="en-US" dirty="0"/>
-              <a:t>11/10/2024</a:t>
+              <a:t>12/1/2024</a:t>
             </a:fld>
             <a:endParaRPr lang="en-US" dirty="0"/>
           </a:p>
@@ -8157,7 +8156,7 @@
           <a:p>
             <a:fld id="{4509A250-FF31-4206-8172-F9D3106AACB1}" type="datetimeFigureOut">
               <a:rPr lang="en-US" dirty="0"/>
-              <a:t>11/10/2024</a:t>
+              <a:t>12/1/2024</a:t>
             </a:fld>
             <a:endParaRPr lang="en-US" dirty="0"/>
           </a:p>
@@ -8427,7 +8426,7 @@
           <a:p>
             <a:fld id="{4509A250-FF31-4206-8172-F9D3106AACB1}" type="datetimeFigureOut">
               <a:rPr lang="en-US" dirty="0"/>
-              <a:t>11/10/2024</a:t>
+              <a:t>12/1/2024</a:t>
             </a:fld>
             <a:endParaRPr lang="en-US" dirty="0"/>
           </a:p>
@@ -8845,7 +8844,7 @@
           <a:p>
             <a:fld id="{4AAD347D-5ACD-4C99-B74B-A9C85AD731AF}" type="datetimeFigureOut">
               <a:rPr lang="en-US" dirty="0"/>
-              <a:t>11/10/2024</a:t>
+              <a:t>12/1/2024</a:t>
             </a:fld>
             <a:endParaRPr lang="en-US" dirty="0"/>
           </a:p>
@@ -10482,14 +10481,14 @@
           <p:nvPr>
             <p:extLst>
               <p:ext uri="{D42A27DB-BD31-4B8C-83A1-F6EECF244321}">
-                <p14:modId xmlns:p14="http://schemas.microsoft.com/office/powerpoint/2010/main" val="102324587"/>
+                <p14:modId xmlns:p14="http://schemas.microsoft.com/office/powerpoint/2010/main" val="450663463"/>
               </p:ext>
             </p:extLst>
           </p:nvPr>
         </p:nvGraphicFramePr>
         <p:xfrm>
-          <a:off x="146305" y="212231"/>
-          <a:ext cx="7222648" cy="6472034"/>
+          <a:off x="172720" y="212231"/>
+          <a:ext cx="7196233" cy="6472034"/>
         </p:xfrm>
         <a:graphic>
           <a:graphicData uri="http://schemas.openxmlformats.org/drawingml/2006/table">
@@ -10498,7 +10497,7 @@
                 <a:tableStyleId>{5C22544A-7EE6-4342-B048-85BDC9FD1C3A}</a:tableStyleId>
               </a:tblPr>
               <a:tblGrid>
-                <a:gridCol w="2042990">
+                <a:gridCol w="2016575">
                   <a:extLst>
                     <a:ext uri="{9D8B030D-6E8A-4147-A177-3AD203B41FA5}">
                       <a16:colId xmlns:a16="http://schemas.microsoft.com/office/drawing/2014/main" val="4021132541"/>
@@ -10527,10 +10526,10 @@
                     <a:lstStyle/>
                     <a:p>
                       <a:r>
-                        <a:rPr lang="en-GB" sz="1300"/>
+                        <a:rPr lang="en-GB" sz="1300" dirty="0"/>
                         <a:t>Feature</a:t>
                       </a:r>
-                      <a:endParaRPr lang="en-NL" sz="1300"/>
+                      <a:endParaRPr lang="en-NL" sz="1300" dirty="0"/>
                     </a:p>
                   </a:txBody>
                   <a:tcPr marL="68366" marR="68366" marT="34183" marB="34183"/>
@@ -10576,10 +10575,10 @@
                     <a:lstStyle/>
                     <a:p>
                       <a:r>
-                        <a:rPr lang="en-GB" sz="1300"/>
+                        <a:rPr lang="en-GB" sz="1300" dirty="0"/>
                         <a:t>Deployment Strategies</a:t>
                       </a:r>
-                      <a:endParaRPr lang="en-NL" sz="1300"/>
+                      <a:endParaRPr lang="en-NL" sz="1300" dirty="0"/>
                     </a:p>
                   </a:txBody>
                   <a:tcPr marL="68366" marR="68366" marT="34183" marB="34183"/>
@@ -10590,10 +10589,10 @@
                     <a:lstStyle/>
                     <a:p>
                       <a:r>
-                        <a:rPr lang="en-GB" sz="1300"/>
+                        <a:rPr lang="en-GB" sz="1300" dirty="0"/>
                         <a:t>Built-in support for canary, blue-green and rolling updates</a:t>
                       </a:r>
-                      <a:endParaRPr lang="en-NL" sz="1300"/>
+                      <a:endParaRPr lang="en-NL" sz="1300" dirty="0"/>
                     </a:p>
                   </a:txBody>
                   <a:tcPr marL="68366" marR="68366" marT="34183" marB="34183"/>
@@ -10625,10 +10624,10 @@
                     <a:lstStyle/>
                     <a:p>
                       <a:r>
-                        <a:rPr lang="en-GB" sz="1300"/>
+                        <a:rPr lang="en-GB" sz="1300" dirty="0"/>
                         <a:t>Pipeline configuration</a:t>
                       </a:r>
-                      <a:endParaRPr lang="en-NL" sz="1300"/>
+                      <a:endParaRPr lang="en-NL" sz="1300" dirty="0"/>
                     </a:p>
                   </a:txBody>
                   <a:tcPr marL="68366" marR="68366" marT="34183" marB="34183"/>
@@ -10639,14 +10638,14 @@
                     <a:lstStyle/>
                     <a:p>
                       <a:r>
-                        <a:rPr lang="en-GB" sz="1300"/>
+                        <a:rPr lang="en-GB" sz="1300" dirty="0"/>
                         <a:t>YAML file stored in </a:t>
                       </a:r>
                       <a:r>
-                        <a:rPr lang="nl-NL" sz="1300"/>
+                        <a:rPr lang="nl-NL" sz="1300" dirty="0"/>
                         <a:t>.gitlab-ci.yml(includes CI Lint tool)</a:t>
                       </a:r>
-                      <a:endParaRPr lang="en-NL" sz="1300"/>
+                      <a:endParaRPr lang="en-NL" sz="1300" dirty="0"/>
                     </a:p>
                   </a:txBody>
                   <a:tcPr marL="68366" marR="68366" marT="34183" marB="34183"/>
@@ -10681,7 +10680,7 @@
                         <a:rPr lang="en-GB" sz="1300"/>
                         <a:t>Supported Runners</a:t>
                       </a:r>
-                      <a:endParaRPr lang="en-NL" sz="1300"/>
+                      <a:endParaRPr lang="en-NL" sz="1300" dirty="0"/>
                     </a:p>
                   </a:txBody>
                   <a:tcPr marL="68366" marR="68366" marT="34183" marB="34183"/>
@@ -10727,7 +10726,7 @@
                     <a:lstStyle/>
                     <a:p>
                       <a:r>
-                        <a:rPr lang="en-GB" sz="1300" dirty="0"/>
+                        <a:rPr lang="en-GB" sz="1300"/>
                         <a:t>Marketplace/Plugins</a:t>
                       </a:r>
                       <a:endParaRPr lang="en-NL" sz="1300" dirty="0"/>
@@ -10793,7 +10792,7 @@
                         <a:defRPr/>
                       </a:pPr>
                       <a:r>
-                        <a:rPr lang="en-GB" sz="1300" dirty="0"/>
+                        <a:rPr lang="en-GB" sz="1300"/>
                         <a:t>Integration</a:t>
                       </a:r>
                       <a:endParaRPr lang="en-NL" sz="1300" dirty="0"/>
@@ -10858,13 +10857,13 @@
                         <a:defRPr/>
                       </a:pPr>
                       <a:r>
-                        <a:rPr lang="en-US" sz="1300"/>
+                        <a:rPr lang="en-US" sz="1300" dirty="0"/>
                         <a:t>Integrated tightly with GitHub features like repositories, pull requests, and issue tracking.</a:t>
                       </a:r>
-                      <a:endParaRPr lang="en-NL" sz="1300"/>
+                      <a:endParaRPr lang="en-NL" sz="1300" dirty="0"/>
                     </a:p>
                     <a:p>
-                      <a:endParaRPr lang="en-NL" sz="1300"/>
+                      <a:endParaRPr lang="en-NL" sz="1300" dirty="0"/>
                     </a:p>
                   </a:txBody>
                   <a:tcPr marL="68366" marR="68366" marT="34183" marB="34183"/>
@@ -10882,7 +10881,7 @@
                     <a:lstStyle/>
                     <a:p>
                       <a:r>
-                        <a:rPr lang="nl-NL" sz="1300" dirty="0"/>
+                        <a:rPr lang="nl-NL" sz="1300"/>
                         <a:t>Cost</a:t>
                       </a:r>
                       <a:endParaRPr lang="en-NL" sz="1300" dirty="0"/>
@@ -10931,7 +10930,7 @@
                     <a:lstStyle/>
                     <a:p>
                       <a:r>
-                        <a:rPr lang="nl-NL" sz="1400" dirty="0"/>
+                        <a:rPr lang="nl-NL" sz="1400"/>
                         <a:t>Security</a:t>
                       </a:r>
                       <a:endParaRPr lang="en-NL" sz="1300" dirty="0"/>
@@ -10945,7 +10944,7 @@
                     <a:lstStyle/>
                     <a:p>
                       <a:r>
-                        <a:rPr lang="en-US" sz="1400" dirty="0"/>
+                        <a:rPr lang="en-US" sz="1400"/>
                         <a:t>Protected variables exposed only to specific branches/tags.</a:t>
                       </a:r>
                       <a:endParaRPr lang="en-NL" sz="1300" dirty="0"/>
@@ -12398,215 +12397,6 @@
           <p:cNvPr id="2" name="Title 1">
             <a:extLst>
               <a:ext uri="{FF2B5EF4-FFF2-40B4-BE49-F238E27FC236}">
-                <a16:creationId xmlns:a16="http://schemas.microsoft.com/office/drawing/2014/main" id="{421E4129-C3A5-0D11-8A16-DD8939F9494B}"/>
-              </a:ext>
-            </a:extLst>
-          </p:cNvPr>
-          <p:cNvSpPr>
-            <a:spLocks noGrp="1"/>
-          </p:cNvSpPr>
-          <p:nvPr>
-            <p:ph type="title"/>
-          </p:nvPr>
-        </p:nvSpPr>
-        <p:spPr/>
-        <p:txBody>
-          <a:bodyPr/>
-          <a:lstStyle/>
-          <a:p>
-            <a:r>
-              <a:rPr lang="nl-NL" dirty="0"/>
-              <a:t>Social Media Integration Example</a:t>
-            </a:r>
-            <a:endParaRPr lang="en-NL" dirty="0"/>
-          </a:p>
-        </p:txBody>
-      </p:sp>
-      <p:sp>
-        <p:nvSpPr>
-          <p:cNvPr id="3" name="Text Placeholder 2">
-            <a:extLst>
-              <a:ext uri="{FF2B5EF4-FFF2-40B4-BE49-F238E27FC236}">
-                <a16:creationId xmlns:a16="http://schemas.microsoft.com/office/drawing/2014/main" id="{1ED378D8-055F-7665-9254-058CE4F984C7}"/>
-              </a:ext>
-            </a:extLst>
-          </p:cNvPr>
-          <p:cNvSpPr>
-            <a:spLocks noGrp="1"/>
-          </p:cNvSpPr>
-          <p:nvPr>
-            <p:ph type="body" idx="1"/>
-          </p:nvPr>
-        </p:nvSpPr>
-        <p:spPr/>
-        <p:txBody>
-          <a:bodyPr/>
-          <a:lstStyle/>
-          <a:p>
-            <a:endParaRPr lang="en-NL"/>
-          </a:p>
-        </p:txBody>
-      </p:sp>
-      <p:sp>
-        <p:nvSpPr>
-          <p:cNvPr id="4" name="Text Placeholder 3">
-            <a:extLst>
-              <a:ext uri="{FF2B5EF4-FFF2-40B4-BE49-F238E27FC236}">
-                <a16:creationId xmlns:a16="http://schemas.microsoft.com/office/drawing/2014/main" id="{6D2E1CE1-6AA3-FAFB-47A5-1147C6DB3578}"/>
-              </a:ext>
-            </a:extLst>
-          </p:cNvPr>
-          <p:cNvSpPr>
-            <a:spLocks noGrp="1"/>
-          </p:cNvSpPr>
-          <p:nvPr>
-            <p:ph type="body" sz="half" idx="15"/>
-          </p:nvPr>
-        </p:nvSpPr>
-        <p:spPr/>
-        <p:txBody>
-          <a:bodyPr/>
-          <a:lstStyle/>
-          <a:p>
-            <a:endParaRPr lang="en-NL"/>
-          </a:p>
-        </p:txBody>
-      </p:sp>
-      <p:sp>
-        <p:nvSpPr>
-          <p:cNvPr id="5" name="Text Placeholder 4">
-            <a:extLst>
-              <a:ext uri="{FF2B5EF4-FFF2-40B4-BE49-F238E27FC236}">
-                <a16:creationId xmlns:a16="http://schemas.microsoft.com/office/drawing/2014/main" id="{EE8B2B9B-7376-D2EC-1084-0D6ECFBF23D6}"/>
-              </a:ext>
-            </a:extLst>
-          </p:cNvPr>
-          <p:cNvSpPr>
-            <a:spLocks noGrp="1"/>
-          </p:cNvSpPr>
-          <p:nvPr>
-            <p:ph type="body" sz="quarter" idx="3"/>
-          </p:nvPr>
-        </p:nvSpPr>
-        <p:spPr/>
-        <p:txBody>
-          <a:bodyPr/>
-          <a:lstStyle/>
-          <a:p>
-            <a:endParaRPr lang="en-NL"/>
-          </a:p>
-        </p:txBody>
-      </p:sp>
-      <p:sp>
-        <p:nvSpPr>
-          <p:cNvPr id="6" name="Text Placeholder 5">
-            <a:extLst>
-              <a:ext uri="{FF2B5EF4-FFF2-40B4-BE49-F238E27FC236}">
-                <a16:creationId xmlns:a16="http://schemas.microsoft.com/office/drawing/2014/main" id="{A755CC14-6755-A0DA-2E50-F88F160A2A21}"/>
-              </a:ext>
-            </a:extLst>
-          </p:cNvPr>
-          <p:cNvSpPr>
-            <a:spLocks noGrp="1"/>
-          </p:cNvSpPr>
-          <p:nvPr>
-            <p:ph type="body" sz="half" idx="16"/>
-          </p:nvPr>
-        </p:nvSpPr>
-        <p:spPr/>
-        <p:txBody>
-          <a:bodyPr/>
-          <a:lstStyle/>
-          <a:p>
-            <a:endParaRPr lang="en-NL"/>
-          </a:p>
-        </p:txBody>
-      </p:sp>
-      <p:sp>
-        <p:nvSpPr>
-          <p:cNvPr id="7" name="Text Placeholder 6">
-            <a:extLst>
-              <a:ext uri="{FF2B5EF4-FFF2-40B4-BE49-F238E27FC236}">
-                <a16:creationId xmlns:a16="http://schemas.microsoft.com/office/drawing/2014/main" id="{5121C0DC-7F87-6A72-C60B-98FD88CB180E}"/>
-              </a:ext>
-            </a:extLst>
-          </p:cNvPr>
-          <p:cNvSpPr>
-            <a:spLocks noGrp="1"/>
-          </p:cNvSpPr>
-          <p:nvPr>
-            <p:ph type="body" sz="quarter" idx="13"/>
-          </p:nvPr>
-        </p:nvSpPr>
-        <p:spPr/>
-        <p:txBody>
-          <a:bodyPr/>
-          <a:lstStyle/>
-          <a:p>
-            <a:endParaRPr lang="en-NL"/>
-          </a:p>
-        </p:txBody>
-      </p:sp>
-      <p:sp>
-        <p:nvSpPr>
-          <p:cNvPr id="8" name="Text Placeholder 7">
-            <a:extLst>
-              <a:ext uri="{FF2B5EF4-FFF2-40B4-BE49-F238E27FC236}">
-                <a16:creationId xmlns:a16="http://schemas.microsoft.com/office/drawing/2014/main" id="{8741E380-CC0A-0E24-1328-0451FAE22263}"/>
-              </a:ext>
-            </a:extLst>
-          </p:cNvPr>
-          <p:cNvSpPr>
-            <a:spLocks noGrp="1"/>
-          </p:cNvSpPr>
-          <p:nvPr>
-            <p:ph type="body" sz="half" idx="17"/>
-          </p:nvPr>
-        </p:nvSpPr>
-        <p:spPr/>
-        <p:txBody>
-          <a:bodyPr/>
-          <a:lstStyle/>
-          <a:p>
-            <a:endParaRPr lang="en-NL"/>
-          </a:p>
-        </p:txBody>
-      </p:sp>
-    </p:spTree>
-    <p:extLst>
-      <p:ext uri="{BB962C8B-B14F-4D97-AF65-F5344CB8AC3E}">
-        <p14:creationId xmlns:p14="http://schemas.microsoft.com/office/powerpoint/2010/main" val="2173922145"/>
-      </p:ext>
-    </p:extLst>
-  </p:cSld>
-  <p:clrMapOvr>
-    <a:masterClrMapping/>
-  </p:clrMapOvr>
-</p:sld>
-</file>
-
-<file path=ppt/slides/slide13.xml><?xml version="1.0" encoding="utf-8"?>
-<p:sld xmlns:a="http://schemas.openxmlformats.org/drawingml/2006/main" xmlns:r="http://schemas.openxmlformats.org/officeDocument/2006/relationships" xmlns:p="http://schemas.openxmlformats.org/presentationml/2006/main">
-  <p:cSld>
-    <p:spTree>
-      <p:nvGrpSpPr>
-        <p:cNvPr id="1" name=""/>
-        <p:cNvGrpSpPr/>
-        <p:nvPr/>
-      </p:nvGrpSpPr>
-      <p:grpSpPr>
-        <a:xfrm>
-          <a:off x="0" y="0"/>
-          <a:ext cx="0" cy="0"/>
-          <a:chOff x="0" y="0"/>
-          <a:chExt cx="0" cy="0"/>
-        </a:xfrm>
-      </p:grpSpPr>
-      <p:sp>
-        <p:nvSpPr>
-          <p:cNvPr id="2" name="Title 1">
-            <a:extLst>
-              <a:ext uri="{FF2B5EF4-FFF2-40B4-BE49-F238E27FC236}">
                 <a16:creationId xmlns:a16="http://schemas.microsoft.com/office/drawing/2014/main" id="{EC894CEE-C723-D04D-4246-F43CD9BBA61B}"/>
               </a:ext>
             </a:extLst>
@@ -12664,53 +12454,6 @@
           </a:p>
         </p:txBody>
       </p:sp>
-      <p:pic>
-        <p:nvPicPr>
-          <p:cNvPr id="2052" name="Picture 4" descr="How Do I Segregate Environments | Bunnyshell">
-            <a:extLst>
-              <a:ext uri="{FF2B5EF4-FFF2-40B4-BE49-F238E27FC236}">
-                <a16:creationId xmlns:a16="http://schemas.microsoft.com/office/drawing/2014/main" id="{67F0F423-1E98-0DAD-8AD8-4340451A5316}"/>
-              </a:ext>
-            </a:extLst>
-          </p:cNvPr>
-          <p:cNvPicPr>
-            <a:picLocks noChangeAspect="1" noChangeArrowheads="1"/>
-          </p:cNvPicPr>
-          <p:nvPr/>
-        </p:nvPicPr>
-        <p:blipFill>
-          <a:blip r:embed="rId2">
-            <a:extLst>
-              <a:ext uri="{28A0092B-C50C-407E-A947-70E740481C1C}">
-                <a14:useLocalDpi xmlns:a14="http://schemas.microsoft.com/office/drawing/2010/main" val="0"/>
-              </a:ext>
-            </a:extLst>
-          </a:blip>
-          <a:srcRect/>
-          <a:stretch>
-            <a:fillRect/>
-          </a:stretch>
-        </p:blipFill>
-        <p:spPr bwMode="auto">
-          <a:xfrm>
-            <a:off x="2594008" y="3901098"/>
-            <a:ext cx="5715000" cy="1908439"/>
-          </a:xfrm>
-          <a:prstGeom prst="rect">
-            <a:avLst/>
-          </a:prstGeom>
-          <a:noFill/>
-          <a:extLst>
-            <a:ext uri="{909E8E84-426E-40DD-AFC4-6F175D3DCCD1}">
-              <a14:hiddenFill xmlns:a14="http://schemas.microsoft.com/office/drawing/2010/main">
-                <a:solidFill>
-                  <a:srgbClr val="FFFFFF"/>
-                </a:solidFill>
-              </a14:hiddenFill>
-            </a:ext>
-          </a:extLst>
-        </p:spPr>
-      </p:pic>
     </p:spTree>
     <p:extLst>
       <p:ext uri="{BB962C8B-B14F-4D97-AF65-F5344CB8AC3E}">
@@ -15095,7 +14838,7 @@
         <p:spPr>
           <a:xfrm>
             <a:off x="0" y="-69270"/>
-            <a:ext cx="9404723" cy="1400530"/>
+            <a:ext cx="12676909" cy="684457"/>
           </a:xfrm>
         </p:spPr>
         <p:txBody>
@@ -15128,13 +14871,13 @@
         </p:nvSpPr>
         <p:spPr>
           <a:xfrm>
-            <a:off x="6340001" y="1331306"/>
-            <a:ext cx="5795750" cy="5489420"/>
+            <a:off x="6481823" y="615187"/>
+            <a:ext cx="5795750" cy="6205537"/>
           </a:xfrm>
         </p:spPr>
         <p:txBody>
           <a:bodyPr>
-            <a:normAutofit lnSpcReduction="10000"/>
+            <a:normAutofit fontScale="92500" lnSpcReduction="10000"/>
           </a:bodyPr>
           <a:lstStyle/>
           <a:p>
@@ -15220,6 +14963,23 @@
               <a:rPr lang="en-US" sz="1300" dirty="0"/>
               <a:t>keyword in GitHub Actions is used to specify a command or a script that should be executed as part of a step within a job. Essentially, it allows you to write commands that you would normally run in a terminal, such as installing dependencies, building your code, or running tests.</a:t>
             </a:r>
+          </a:p>
+          <a:p>
+            <a:r>
+              <a:rPr lang="en-US" sz="1300" dirty="0"/>
+              <a:t>Upload artifacts: The upload-artifact action in GitHub Actions is used to store files or directories (artifacts) from a workflow run. It allows you to upload build outputs, logs, or other files generated during a job. These artifacts can later be downloaded for debugging, sharing, or use in subsequent jobs.</a:t>
+            </a:r>
+          </a:p>
+          <a:p>
+            <a:endParaRPr lang="en-US" sz="1300" dirty="0"/>
+          </a:p>
+          <a:p>
+            <a:endParaRPr lang="en-US" sz="1300" dirty="0"/>
+          </a:p>
+          <a:p>
+            <a:endParaRPr lang="en-US" sz="1300" dirty="0"/>
+          </a:p>
+          <a:p>
             <a:endParaRPr lang="en-NL" dirty="0"/>
           </a:p>
         </p:txBody>
@@ -15246,7 +15006,7 @@
         </p:blipFill>
         <p:spPr>
           <a:xfrm>
-            <a:off x="56250" y="1331213"/>
+            <a:off x="0" y="684243"/>
             <a:ext cx="6340001" cy="5489513"/>
           </a:xfrm>
           <a:prstGeom prst="rect">
@@ -15254,6 +15014,93 @@
           </a:prstGeom>
         </p:spPr>
       </p:pic>
+      <p:sp>
+        <p:nvSpPr>
+          <p:cNvPr id="8" name="TextBox 7">
+            <a:extLst>
+              <a:ext uri="{FF2B5EF4-FFF2-40B4-BE49-F238E27FC236}">
+                <a16:creationId xmlns:a16="http://schemas.microsoft.com/office/drawing/2014/main" id="{6B739309-2557-CE5C-860D-9FB1ABAAB911}"/>
+              </a:ext>
+            </a:extLst>
+          </p:cNvPr>
+          <p:cNvSpPr txBox="1"/>
+          <p:nvPr/>
+        </p:nvSpPr>
+        <p:spPr>
+          <a:xfrm>
+            <a:off x="2104031" y="4119936"/>
+            <a:ext cx="4708340" cy="2862322"/>
+          </a:xfrm>
+          <a:prstGeom prst="rect">
+            <a:avLst/>
+          </a:prstGeom>
+          <a:noFill/>
+        </p:spPr>
+        <p:txBody>
+          <a:bodyPr wrap="none" rtlCol="0">
+            <a:spAutoFit/>
+          </a:bodyPr>
+          <a:lstStyle/>
+          <a:p>
+            <a:r>
+              <a:rPr lang="en-US" dirty="0"/>
+              <a:t> - name: Upload artifacts</a:t>
+            </a:r>
+          </a:p>
+          <a:p>
+            <a:r>
+              <a:rPr lang="en-US" dirty="0"/>
+              <a:t>        uses: actions/upload-artifact@v3</a:t>
+            </a:r>
+          </a:p>
+          <a:p>
+            <a:r>
+              <a:rPr lang="en-US" dirty="0"/>
+              <a:t>        with:</a:t>
+            </a:r>
+          </a:p>
+          <a:p>
+            <a:r>
+              <a:rPr lang="en-US" dirty="0"/>
+              <a:t>          name: build-artifact</a:t>
+            </a:r>
+          </a:p>
+          <a:p>
+            <a:r>
+              <a:rPr lang="en-US" dirty="0"/>
+              <a:t>          path: .</a:t>
+            </a:r>
+          </a:p>
+          <a:p>
+            <a:endParaRPr lang="en-US" dirty="0"/>
+          </a:p>
+          <a:p>
+            <a:r>
+              <a:rPr lang="en-US" dirty="0"/>
+              <a:t> - name: Download build artifact</a:t>
+            </a:r>
+          </a:p>
+          <a:p>
+            <a:r>
+              <a:rPr lang="en-US" dirty="0"/>
+              <a:t>        uses: actions/download-artifact@v3</a:t>
+            </a:r>
+          </a:p>
+          <a:p>
+            <a:r>
+              <a:rPr lang="en-US" dirty="0"/>
+              <a:t>        with:</a:t>
+            </a:r>
+          </a:p>
+          <a:p>
+            <a:r>
+              <a:rPr lang="en-US" dirty="0"/>
+              <a:t>          name: build-artifact</a:t>
+            </a:r>
+            <a:endParaRPr lang="en-NL" dirty="0"/>
+          </a:p>
+        </p:txBody>
+      </p:sp>
     </p:spTree>
     <p:extLst>
       <p:ext uri="{BB962C8B-B14F-4D97-AF65-F5344CB8AC3E}">
@@ -15695,37 +15542,37 @@
         </p:spPr>
         <p:txBody>
           <a:bodyPr>
-            <a:normAutofit lnSpcReduction="10000"/>
+            <a:normAutofit/>
           </a:bodyPr>
           <a:lstStyle/>
           <a:p>
             <a:r>
               <a:rPr lang="en-US" dirty="0"/>
-              <a:t>Managed by GitHub: Provided and maintained by GitHub.</a:t>
+              <a:t>Managed by GitHub.</a:t>
             </a:r>
           </a:p>
           <a:p>
             <a:r>
               <a:rPr lang="en-US" dirty="0"/>
-              <a:t>Pre-Installed Tools: Comes with popular tools (e.g., Node.js, Python, Java).</a:t>
+              <a:t>Pre-Installed Tools.</a:t>
             </a:r>
           </a:p>
           <a:p>
             <a:r>
               <a:rPr lang="en-US" dirty="0"/>
-              <a:t>Ease of Use: No setup required—ready to use.</a:t>
+              <a:t>Ease of Use.</a:t>
             </a:r>
           </a:p>
           <a:p>
             <a:r>
               <a:rPr lang="en-US" dirty="0"/>
-              <a:t>Resource Limitations: Limited CPU, memory, and usage quotas.</a:t>
+              <a:t>Resource Limitations.</a:t>
             </a:r>
           </a:p>
           <a:p>
             <a:r>
               <a:rPr lang="en-US" dirty="0"/>
-              <a:t>Scenarios: Best for typical CI/CD tasks, rapid prototyping, open source projects.</a:t>
+              <a:t>Scenarios.</a:t>
             </a:r>
           </a:p>
           <a:p>
@@ -15785,37 +15632,37 @@
         </p:spPr>
         <p:txBody>
           <a:bodyPr>
-            <a:normAutofit lnSpcReduction="10000"/>
+            <a:normAutofit/>
           </a:bodyPr>
           <a:lstStyle/>
           <a:p>
             <a:r>
               <a:rPr lang="en-US" dirty="0"/>
-              <a:t>Managed by You: Installed and maintained on your own infrastructure.</a:t>
+              <a:t>Managed by You.</a:t>
             </a:r>
           </a:p>
           <a:p>
             <a:r>
               <a:rPr lang="en-US" dirty="0"/>
-              <a:t>Custom Environment: Full control over hardware, operating system, and software.</a:t>
+              <a:t>Custom Environment.</a:t>
             </a:r>
           </a:p>
           <a:p>
             <a:r>
               <a:rPr lang="en-US" dirty="0"/>
-              <a:t>“Unlimited” Resources: No quotas or limits; can be configured as needed.</a:t>
+              <a:t>“Unlimited” Resources.</a:t>
             </a:r>
           </a:p>
           <a:p>
             <a:r>
               <a:rPr lang="en-US" dirty="0"/>
-              <a:t>Cost Savings: Utilize existing infrastructure, potentially reducing costs for large projects.</a:t>
+              <a:t>Cost Savings.</a:t>
             </a:r>
           </a:p>
           <a:p>
             <a:r>
               <a:rPr lang="en-US" dirty="0"/>
-              <a:t>Scenarios: Suitable for custom requirements, large workloads, privacy-sensitive projects.</a:t>
+              <a:t>Scenarios.</a:t>
             </a:r>
           </a:p>
           <a:p>
@@ -16417,7 +16264,7 @@
 
 <file path=ppt/webextensions/taskpanes.xml><?xml version="1.0" encoding="utf-8"?>
 <wetp:taskpanes xmlns:wetp="http://schemas.microsoft.com/office/webextensions/taskpanes/2010/11">
-  <wetp:taskpane dockstate="right" visibility="0" width="438" row="2">
+  <wetp:taskpane dockstate="right" visibility="0" width="438" row="0">
     <wetp:webextensionref xmlns:r="http://schemas.openxmlformats.org/officeDocument/2006/relationships" r:id="rId1"/>
   </wetp:taskpane>
 </wetp:taskpanes>

</xml_diff>